<commit_message>
[V0.4][Doc] Update Logic component diagram
</commit_message>
<xml_diff>
--- a/docs/diagrams/LogicComponentClassDiagram.pptx
+++ b/docs/diagrams/LogicComponentClassDiagram.pptx
@@ -208,7 +208,7 @@
           <a:p>
             <a:fld id="{F5CC4B3F-88C1-4FFA-B1B6-F41C21DC6924}" type="datetimeFigureOut">
               <a:rPr lang="en-US" smtClean="0"/>
-              <a:t>2/2/2017</a:t>
+              <a:t>3/28/2017</a:t>
             </a:fld>
             <a:endParaRPr lang="en-US"/>
           </a:p>
@@ -657,7 +657,7 @@
           <a:p>
             <a:fld id="{78C97017-6FC3-485B-9764-EAC9E56C1D49}" type="datetimeFigureOut">
               <a:rPr lang="en-US" smtClean="0"/>
-              <a:t>2/2/2017</a:t>
+              <a:t>3/28/2017</a:t>
             </a:fld>
             <a:endParaRPr lang="en-US"/>
           </a:p>
@@ -827,7 +827,7 @@
           <a:p>
             <a:fld id="{78C97017-6FC3-485B-9764-EAC9E56C1D49}" type="datetimeFigureOut">
               <a:rPr lang="en-US" smtClean="0"/>
-              <a:t>2/2/2017</a:t>
+              <a:t>3/28/2017</a:t>
             </a:fld>
             <a:endParaRPr lang="en-US"/>
           </a:p>
@@ -1007,7 +1007,7 @@
           <a:p>
             <a:fld id="{78C97017-6FC3-485B-9764-EAC9E56C1D49}" type="datetimeFigureOut">
               <a:rPr lang="en-US" smtClean="0"/>
-              <a:t>2/2/2017</a:t>
+              <a:t>3/28/2017</a:t>
             </a:fld>
             <a:endParaRPr lang="en-US"/>
           </a:p>
@@ -1177,7 +1177,7 @@
           <a:p>
             <a:fld id="{78C97017-6FC3-485B-9764-EAC9E56C1D49}" type="datetimeFigureOut">
               <a:rPr lang="en-US" smtClean="0"/>
-              <a:t>2/2/2017</a:t>
+              <a:t>3/28/2017</a:t>
             </a:fld>
             <a:endParaRPr lang="en-US"/>
           </a:p>
@@ -1423,7 +1423,7 @@
           <a:p>
             <a:fld id="{78C97017-6FC3-485B-9764-EAC9E56C1D49}" type="datetimeFigureOut">
               <a:rPr lang="en-US" smtClean="0"/>
-              <a:t>2/2/2017</a:t>
+              <a:t>3/28/2017</a:t>
             </a:fld>
             <a:endParaRPr lang="en-US"/>
           </a:p>
@@ -1711,7 +1711,7 @@
           <a:p>
             <a:fld id="{78C97017-6FC3-485B-9764-EAC9E56C1D49}" type="datetimeFigureOut">
               <a:rPr lang="en-US" smtClean="0"/>
-              <a:t>2/2/2017</a:t>
+              <a:t>3/28/2017</a:t>
             </a:fld>
             <a:endParaRPr lang="en-US"/>
           </a:p>
@@ -2133,7 +2133,7 @@
           <a:p>
             <a:fld id="{78C97017-6FC3-485B-9764-EAC9E56C1D49}" type="datetimeFigureOut">
               <a:rPr lang="en-US" smtClean="0"/>
-              <a:t>2/2/2017</a:t>
+              <a:t>3/28/2017</a:t>
             </a:fld>
             <a:endParaRPr lang="en-US"/>
           </a:p>
@@ -2251,7 +2251,7 @@
           <a:p>
             <a:fld id="{78C97017-6FC3-485B-9764-EAC9E56C1D49}" type="datetimeFigureOut">
               <a:rPr lang="en-US" smtClean="0"/>
-              <a:t>2/2/2017</a:t>
+              <a:t>3/28/2017</a:t>
             </a:fld>
             <a:endParaRPr lang="en-US"/>
           </a:p>
@@ -2346,7 +2346,7 @@
           <a:p>
             <a:fld id="{78C97017-6FC3-485B-9764-EAC9E56C1D49}" type="datetimeFigureOut">
               <a:rPr lang="en-US" smtClean="0"/>
-              <a:t>2/2/2017</a:t>
+              <a:t>3/28/2017</a:t>
             </a:fld>
             <a:endParaRPr lang="en-US"/>
           </a:p>
@@ -2623,7 +2623,7 @@
           <a:p>
             <a:fld id="{78C97017-6FC3-485B-9764-EAC9E56C1D49}" type="datetimeFigureOut">
               <a:rPr lang="en-US" smtClean="0"/>
-              <a:t>2/2/2017</a:t>
+              <a:t>3/28/2017</a:t>
             </a:fld>
             <a:endParaRPr lang="en-US"/>
           </a:p>
@@ -2876,7 +2876,7 @@
           <a:p>
             <a:fld id="{78C97017-6FC3-485B-9764-EAC9E56C1D49}" type="datetimeFigureOut">
               <a:rPr lang="en-US" smtClean="0"/>
-              <a:t>2/2/2017</a:t>
+              <a:t>3/28/2017</a:t>
             </a:fld>
             <a:endParaRPr lang="en-US"/>
           </a:p>
@@ -3089,7 +3089,7 @@
           <a:p>
             <a:fld id="{78C97017-6FC3-485B-9764-EAC9E56C1D49}" type="datetimeFigureOut">
               <a:rPr lang="en-US" smtClean="0"/>
-              <a:t>2/2/2017</a:t>
+              <a:t>3/28/2017</a:t>
             </a:fld>
             <a:endParaRPr lang="en-US"/>
           </a:p>
@@ -3472,8 +3472,8 @@
         </p:nvSpPr>
         <p:spPr>
           <a:xfrm>
-            <a:off x="1066800" y="914400"/>
-            <a:ext cx="7467600" cy="3733800"/>
+            <a:off x="838200" y="152400"/>
+            <a:ext cx="8077200" cy="5181600"/>
           </a:xfrm>
           <a:prstGeom prst="roundRect">
             <a:avLst>
@@ -3525,6 +3525,49 @@
           </a:p>
         </p:txBody>
       </p:sp>
+      <p:cxnSp>
+        <p:nvCxnSpPr>
+          <p:cNvPr id="213" name="Elbow Connector 212"/>
+          <p:cNvCxnSpPr/>
+          <p:nvPr/>
+        </p:nvCxnSpPr>
+        <p:spPr>
+          <a:xfrm rot="16200000" flipH="1">
+            <a:off x="3547968" y="2656383"/>
+            <a:ext cx="1419145" cy="1177313"/>
+          </a:xfrm>
+          <a:prstGeom prst="bentConnector3">
+            <a:avLst>
+              <a:gd name="adj1" fmla="val 68256"/>
+            </a:avLst>
+          </a:prstGeom>
+          <a:ln w="19050">
+            <a:solidFill>
+              <a:schemeClr val="accent5">
+                <a:lumMod val="50000"/>
+              </a:schemeClr>
+            </a:solidFill>
+            <a:prstDash val="sysDot"/>
+            <a:headEnd type="none" w="med" len="med"/>
+            <a:tailEnd type="none" w="med" len="med"/>
+          </a:ln>
+          <a:effectLst/>
+        </p:spPr>
+        <p:style>
+          <a:lnRef idx="1">
+            <a:schemeClr val="accent2"/>
+          </a:lnRef>
+          <a:fillRef idx="2">
+            <a:schemeClr val="accent2"/>
+          </a:fillRef>
+          <a:effectRef idx="1">
+            <a:schemeClr val="accent2"/>
+          </a:effectRef>
+          <a:fontRef idx="minor">
+            <a:schemeClr val="dk1"/>
+          </a:fontRef>
+        </p:style>
+      </p:cxnSp>
       <p:sp>
         <p:nvSpPr>
           <p:cNvPr id="3" name="Rectangle 8"/>
@@ -3533,7 +3576,7 @@
         </p:nvSpPr>
         <p:spPr>
           <a:xfrm>
-            <a:off x="2095948" y="1253067"/>
+            <a:off x="1867348" y="491067"/>
             <a:ext cx="1093635" cy="346760"/>
           </a:xfrm>
           <a:prstGeom prst="rect">
@@ -3592,8 +3635,8 @@
         </p:nvSpPr>
         <p:spPr>
           <a:xfrm flipH="1">
-            <a:off x="6520227" y="2149167"/>
-            <a:ext cx="1093635" cy="346760"/>
+            <a:off x="6175570" y="899160"/>
+            <a:ext cx="1093635" cy="301966"/>
           </a:xfrm>
           <a:prstGeom prst="rect">
             <a:avLst/>
@@ -3648,7 +3691,7 @@
         </p:nvSpPr>
         <p:spPr>
           <a:xfrm>
-            <a:off x="1780785" y="3772963"/>
+            <a:off x="1505346" y="4470717"/>
             <a:ext cx="1093635" cy="346760"/>
           </a:xfrm>
           <a:prstGeom prst="rect">
@@ -3710,12 +3753,12 @@
         </p:nvCxnSpPr>
         <p:spPr>
           <a:xfrm flipH="1" flipV="1">
-            <a:off x="3189583" y="1426447"/>
-            <a:ext cx="5020699" cy="2895973"/>
+            <a:off x="2960983" y="664447"/>
+            <a:ext cx="4973860" cy="4355727"/>
           </a:xfrm>
           <a:prstGeom prst="bentConnector3">
             <a:avLst>
-              <a:gd name="adj1" fmla="val -2713"/>
+              <a:gd name="adj1" fmla="val -4596"/>
             </a:avLst>
           </a:prstGeom>
           <a:ln w="19050">
@@ -3753,7 +3796,7 @@
         </p:nvCxnSpPr>
         <p:spPr>
           <a:xfrm>
-            <a:off x="1676400" y="1423587"/>
+            <a:off x="1447800" y="661587"/>
             <a:ext cx="419548" cy="2860"/>
           </a:xfrm>
           <a:prstGeom prst="bentConnector3">
@@ -3794,8 +3837,8 @@
         </p:nvSpPr>
         <p:spPr>
           <a:xfrm>
-            <a:off x="1103085" y="4777355"/>
-            <a:ext cx="7431315" cy="328045"/>
+            <a:off x="874485" y="5478525"/>
+            <a:ext cx="8040915" cy="328045"/>
           </a:xfrm>
           <a:prstGeom prst="roundRect">
             <a:avLst/>
@@ -3854,8 +3897,8 @@
         </p:nvSpPr>
         <p:spPr>
           <a:xfrm flipH="1">
-            <a:off x="6526365" y="2554920"/>
-            <a:ext cx="1093635" cy="346760"/>
+            <a:off x="6172200" y="1307840"/>
+            <a:ext cx="1093635" cy="301966"/>
           </a:xfrm>
           <a:prstGeom prst="rect">
             <a:avLst/>
@@ -3910,8 +3953,8 @@
         </p:nvSpPr>
         <p:spPr>
           <a:xfrm flipH="1">
-            <a:off x="6526365" y="3396383"/>
-            <a:ext cx="1093635" cy="346760"/>
+            <a:off x="6188683" y="4343400"/>
+            <a:ext cx="1093635" cy="301966"/>
           </a:xfrm>
           <a:prstGeom prst="rect">
             <a:avLst/>
@@ -3981,7 +4024,7 @@
         </p:nvSpPr>
         <p:spPr>
           <a:xfrm>
-            <a:off x="7438239" y="4149040"/>
+            <a:off x="7162800" y="4846794"/>
             <a:ext cx="772043" cy="346760"/>
           </a:xfrm>
           <a:prstGeom prst="rect">
@@ -4052,7 +4095,7 @@
         </p:nvSpPr>
         <p:spPr>
           <a:xfrm>
-            <a:off x="3529350" y="3775502"/>
+            <a:off x="3253911" y="4473256"/>
             <a:ext cx="585450" cy="346760"/>
           </a:xfrm>
           <a:prstGeom prst="rect">
@@ -4110,7 +4153,7 @@
         </p:nvCxnSpPr>
         <p:spPr>
           <a:xfrm>
-            <a:off x="2874420" y="3946343"/>
+            <a:off x="2598981" y="4644097"/>
             <a:ext cx="654930" cy="2539"/>
           </a:xfrm>
           <a:prstGeom prst="bentConnector3">
@@ -4153,7 +4196,7 @@
         </p:nvCxnSpPr>
         <p:spPr>
           <a:xfrm>
-            <a:off x="7824261" y="4495800"/>
+            <a:off x="7548822" y="5193554"/>
             <a:ext cx="0" cy="281555"/>
           </a:xfrm>
           <a:prstGeom prst="straightConnector1">
@@ -4192,7 +4235,7 @@
         </p:nvSpPr>
         <p:spPr>
           <a:xfrm rot="16200000">
-            <a:off x="398120" y="2150720"/>
+            <a:off x="169520" y="1388720"/>
             <a:ext cx="2209800" cy="346760"/>
           </a:xfrm>
           <a:prstGeom prst="rect">
@@ -4262,7 +4305,7 @@
         </p:nvSpPr>
         <p:spPr>
           <a:xfrm>
-            <a:off x="1359039" y="3429000"/>
+            <a:off x="1130439" y="2667000"/>
             <a:ext cx="270504" cy="175523"/>
           </a:xfrm>
           <a:prstGeom prst="triangle">
@@ -4319,8 +4362,8 @@
         </p:nvCxnSpPr>
         <p:spPr>
           <a:xfrm rot="10800000">
-            <a:off x="1494291" y="3604523"/>
-            <a:ext cx="286494" cy="341820"/>
+            <a:off x="1265692" y="2842523"/>
+            <a:ext cx="239655" cy="1801574"/>
           </a:xfrm>
           <a:prstGeom prst="bentConnector2">
             <a:avLst/>
@@ -4358,7 +4401,7 @@
         </p:nvCxnSpPr>
         <p:spPr>
           <a:xfrm flipH="1">
-            <a:off x="1981201" y="4122262"/>
+            <a:off x="1705762" y="4820016"/>
             <a:ext cx="1" cy="655093"/>
           </a:xfrm>
           <a:prstGeom prst="straightConnector1">
@@ -4396,7 +4439,7 @@
         </p:nvCxnSpPr>
         <p:spPr>
           <a:xfrm>
-            <a:off x="893311" y="2832505"/>
+            <a:off x="664711" y="2070505"/>
             <a:ext cx="419548" cy="2860"/>
           </a:xfrm>
           <a:prstGeom prst="bentConnector3">
@@ -4442,7 +4485,7 @@
         </p:nvCxnSpPr>
         <p:spPr>
           <a:xfrm rot="16200000" flipH="1">
-            <a:off x="4781573" y="1665753"/>
+            <a:off x="4506134" y="2363507"/>
             <a:ext cx="202697" cy="5110636"/>
           </a:xfrm>
           <a:prstGeom prst="bentConnector2">
@@ -4481,7 +4524,7 @@
         </p:nvGrpSpPr>
         <p:grpSpPr>
           <a:xfrm>
-            <a:off x="4597400" y="4341168"/>
+            <a:off x="4321961" y="5038922"/>
             <a:ext cx="889000" cy="230832"/>
             <a:chOff x="2895600" y="807932"/>
             <a:chExt cx="889000" cy="230832"/>
@@ -4581,7 +4624,7 @@
         </p:nvGrpSpPr>
         <p:grpSpPr>
           <a:xfrm>
-            <a:off x="4665110" y="1219200"/>
+            <a:off x="4436510" y="457200"/>
             <a:ext cx="868568" cy="230832"/>
             <a:chOff x="2755838" y="789460"/>
             <a:chExt cx="868568" cy="230832"/>
@@ -4680,7 +4723,7 @@
         </p:nvSpPr>
         <p:spPr>
           <a:xfrm>
-            <a:off x="2301175" y="1618473"/>
+            <a:off x="2127343" y="865069"/>
             <a:ext cx="131116" cy="230832"/>
           </a:xfrm>
           <a:prstGeom prst="rect">
@@ -4719,7 +4762,7 @@
         </p:nvSpPr>
         <p:spPr>
           <a:xfrm>
-            <a:off x="2912207" y="3709457"/>
+            <a:off x="2636768" y="4407211"/>
             <a:ext cx="131116" cy="230832"/>
           </a:xfrm>
           <a:prstGeom prst="rect">
@@ -4758,8 +4801,8 @@
         </p:nvSpPr>
         <p:spPr>
           <a:xfrm flipH="1">
-            <a:off x="6526365" y="2956137"/>
-            <a:ext cx="1093635" cy="346760"/>
+            <a:off x="6181708" y="1739423"/>
+            <a:ext cx="1093635" cy="301966"/>
           </a:xfrm>
           <a:prstGeom prst="rect">
             <a:avLst/>
@@ -4791,12 +4834,12 @@
           <a:p>
             <a:pPr algn="ctr"/>
             <a:r>
-              <a:rPr lang="en-US" sz="1050" b="1" dirty="0" smtClean="0">
+              <a:rPr lang="en-US" sz="1050" b="1" dirty="0" err="1" smtClean="0">
                 <a:solidFill>
                   <a:srgbClr val="0070C0"/>
                 </a:solidFill>
               </a:rPr>
-              <a:t>…</a:t>
+              <a:t>ViewCommand</a:t>
             </a:r>
             <a:endParaRPr lang="en-SG" sz="1050" b="1" dirty="0">
               <a:solidFill>
@@ -4814,8 +4857,8 @@
         </p:nvCxnSpPr>
         <p:spPr>
           <a:xfrm rot="16200000" flipV="1">
-            <a:off x="1105538" y="2692369"/>
-            <a:ext cx="2147794" cy="2"/>
+            <a:off x="277908" y="2653062"/>
+            <a:ext cx="3611705" cy="2418"/>
           </a:xfrm>
           <a:prstGeom prst="bentConnector3">
             <a:avLst>
@@ -4855,8 +4898,8 @@
         </p:nvSpPr>
         <p:spPr>
           <a:xfrm flipH="1">
-            <a:off x="4664592" y="2148937"/>
-            <a:ext cx="1093635" cy="346760"/>
+            <a:off x="4425642" y="895049"/>
+            <a:ext cx="1093635" cy="312836"/>
           </a:xfrm>
           <a:prstGeom prst="rect">
             <a:avLst/>
@@ -4926,8 +4969,8 @@
         </p:nvSpPr>
         <p:spPr>
           <a:xfrm flipH="1">
-            <a:off x="4664592" y="2555337"/>
-            <a:ext cx="1093635" cy="346760"/>
+            <a:off x="4425642" y="1301449"/>
+            <a:ext cx="1093635" cy="312836"/>
           </a:xfrm>
           <a:prstGeom prst="rect">
             <a:avLst/>
@@ -4997,8 +5040,8 @@
         </p:nvSpPr>
         <p:spPr>
           <a:xfrm flipH="1">
-            <a:off x="4664590" y="2977582"/>
-            <a:ext cx="1093635" cy="346760"/>
+            <a:off x="4425640" y="1723694"/>
+            <a:ext cx="1093635" cy="312836"/>
           </a:xfrm>
           <a:prstGeom prst="rect">
             <a:avLst/>
@@ -5029,12 +5072,28 @@
           <a:p>
             <a:pPr algn="ctr"/>
             <a:r>
-              <a:rPr lang="en-US" sz="1050" b="1" dirty="0">
+              <a:rPr lang="en-US" sz="1050" b="1" dirty="0" err="1" smtClean="0">
                 <a:solidFill>
                   <a:schemeClr val="bg1"/>
                 </a:solidFill>
               </a:rPr>
-              <a:t>…</a:t>
+              <a:t>ViewCommand</a:t>
+            </a:r>
+            <a:endParaRPr lang="en-US" sz="1050" b="1" dirty="0">
+              <a:solidFill>
+                <a:schemeClr val="bg1"/>
+              </a:solidFill>
+            </a:endParaRPr>
+          </a:p>
+          <a:p>
+            <a:pPr algn="ctr"/>
+            <a:r>
+              <a:rPr lang="en-US" sz="1050" b="1" dirty="0" smtClean="0">
+                <a:solidFill>
+                  <a:schemeClr val="bg1"/>
+                </a:solidFill>
+              </a:rPr>
+              <a:t>Parser</a:t>
             </a:r>
             <a:endParaRPr lang="en-SG" sz="1050" b="1" dirty="0">
               <a:solidFill>
@@ -5052,7 +5111,7 @@
         </p:nvSpPr>
         <p:spPr>
           <a:xfrm>
-            <a:off x="2807288" y="1905000"/>
+            <a:off x="2578688" y="1143000"/>
             <a:ext cx="751107" cy="346760"/>
           </a:xfrm>
           <a:prstGeom prst="rect">
@@ -5132,7 +5191,7 @@
         </p:nvSpPr>
         <p:spPr>
           <a:xfrm>
-            <a:off x="2813291" y="2432664"/>
+            <a:off x="2584691" y="1670664"/>
             <a:ext cx="726243" cy="174580"/>
           </a:xfrm>
           <a:prstGeom prst="rect">
@@ -5197,7 +5256,7 @@
         </p:nvGrpSpPr>
         <p:grpSpPr>
           <a:xfrm rot="5400000">
-            <a:off x="5941795" y="1962201"/>
+            <a:off x="5702846" y="708313"/>
             <a:ext cx="254462" cy="555486"/>
             <a:chOff x="3949242" y="712012"/>
             <a:chExt cx="254462" cy="503902"/>
@@ -5302,7 +5361,7 @@
         </p:nvGrpSpPr>
         <p:grpSpPr>
           <a:xfrm rot="5400000">
-            <a:off x="5962853" y="2347569"/>
+            <a:off x="5723904" y="1093681"/>
             <a:ext cx="254462" cy="555486"/>
             <a:chOff x="3949242" y="712012"/>
             <a:chExt cx="254462" cy="503902"/>
@@ -5407,7 +5466,7 @@
         </p:nvSpPr>
         <p:spPr>
           <a:xfrm>
-            <a:off x="2819400" y="2841725"/>
+            <a:off x="2590800" y="2079725"/>
             <a:ext cx="731636" cy="283820"/>
           </a:xfrm>
           <a:prstGeom prst="rect">
@@ -5472,7 +5531,7 @@
         </p:nvSpPr>
         <p:spPr>
           <a:xfrm>
-            <a:off x="2819400" y="3190882"/>
+            <a:off x="2590800" y="2428882"/>
             <a:ext cx="731636" cy="283820"/>
           </a:xfrm>
           <a:prstGeom prst="rect">
@@ -5539,7 +5598,7 @@
         </p:nvCxnSpPr>
         <p:spPr>
           <a:xfrm flipH="1">
-            <a:off x="3551036" y="2983635"/>
+            <a:off x="3322436" y="2221635"/>
             <a:ext cx="335164" cy="0"/>
           </a:xfrm>
           <a:prstGeom prst="straightConnector1">
@@ -5580,7 +5639,7 @@
         </p:nvCxnSpPr>
         <p:spPr>
           <a:xfrm flipH="1" flipV="1">
-            <a:off x="3558396" y="3297471"/>
+            <a:off x="3329796" y="2535471"/>
             <a:ext cx="327804" cy="5426"/>
           </a:xfrm>
           <a:prstGeom prst="straightConnector1">
@@ -5623,7 +5682,7 @@
         </p:nvCxnSpPr>
         <p:spPr>
           <a:xfrm rot="16200000" flipV="1">
-            <a:off x="3063575" y="2720082"/>
+            <a:off x="2834975" y="1958082"/>
             <a:ext cx="234481" cy="8806"/>
           </a:xfrm>
           <a:prstGeom prst="bentConnector3">
@@ -5667,7 +5726,7 @@
         </p:nvCxnSpPr>
         <p:spPr>
           <a:xfrm>
-            <a:off x="3539534" y="2078487"/>
+            <a:off x="3310934" y="1316487"/>
             <a:ext cx="346666" cy="0"/>
           </a:xfrm>
           <a:prstGeom prst="line">
@@ -5711,7 +5770,7 @@
         </p:nvCxnSpPr>
         <p:spPr>
           <a:xfrm rot="5400000">
-            <a:off x="3089176" y="2338998"/>
+            <a:off x="2860576" y="1576998"/>
             <a:ext cx="180904" cy="6429"/>
           </a:xfrm>
           <a:prstGeom prst="bentConnector3">
@@ -5755,7 +5814,7 @@
         </p:nvGrpSpPr>
         <p:grpSpPr>
           <a:xfrm rot="5400000">
-            <a:off x="4090826" y="3633626"/>
+            <a:off x="3793475" y="2862438"/>
             <a:ext cx="555486" cy="254462"/>
             <a:chOff x="3798139" y="875689"/>
             <a:chExt cx="555486" cy="230832"/>
@@ -5863,8 +5922,8 @@
         </p:nvCxnSpPr>
         <p:spPr>
           <a:xfrm rot="16200000" flipV="1">
-            <a:off x="7296652" y="3452865"/>
-            <a:ext cx="850958" cy="204262"/>
+            <a:off x="6018172" y="3147578"/>
+            <a:ext cx="2787823" cy="273480"/>
           </a:xfrm>
           <a:prstGeom prst="bentConnector2">
             <a:avLst/>
@@ -5897,7 +5956,7 @@
         </p:nvSpPr>
         <p:spPr>
           <a:xfrm flipV="1">
-            <a:off x="7689010" y="3980475"/>
+            <a:off x="7413571" y="4678229"/>
             <a:ext cx="270504" cy="175523"/>
           </a:xfrm>
           <a:prstGeom prst="triangle">
@@ -5954,8 +6013,8 @@
         </p:nvCxnSpPr>
         <p:spPr>
           <a:xfrm rot="16200000" flipV="1">
-            <a:off x="7516775" y="3672988"/>
-            <a:ext cx="410712" cy="204262"/>
+            <a:off x="7323648" y="4453053"/>
+            <a:ext cx="183846" cy="266505"/>
           </a:xfrm>
           <a:prstGeom prst="bentConnector2">
             <a:avLst/>
@@ -5991,8 +6050,8 @@
         </p:nvCxnSpPr>
         <p:spPr>
           <a:xfrm rot="16200000" flipV="1">
-            <a:off x="7096044" y="3252257"/>
-            <a:ext cx="1252175" cy="204262"/>
+            <a:off x="5797626" y="2927032"/>
+            <a:ext cx="3219406" cy="282988"/>
           </a:xfrm>
           <a:prstGeom prst="bentConnector2">
             <a:avLst/>
@@ -6028,8 +6087,8 @@
         </p:nvCxnSpPr>
         <p:spPr>
           <a:xfrm rot="16200000" flipV="1">
-            <a:off x="6890098" y="3046311"/>
-            <a:ext cx="1657928" cy="210400"/>
+            <a:off x="5594971" y="2724377"/>
+            <a:ext cx="3628086" cy="279618"/>
           </a:xfrm>
           <a:prstGeom prst="bentConnector2">
             <a:avLst/>
@@ -6065,146 +6124,8 @@
         </p:nvCxnSpPr>
         <p:spPr>
           <a:xfrm flipV="1">
-            <a:off x="4114800" y="3150962"/>
-            <a:ext cx="549790" cy="797920"/>
-          </a:xfrm>
-          <a:prstGeom prst="bentConnector3">
-            <a:avLst>
-              <a:gd name="adj1" fmla="val 14720"/>
-            </a:avLst>
-          </a:prstGeom>
-          <a:ln w="19050">
-            <a:solidFill>
-              <a:schemeClr val="accent5">
-                <a:lumMod val="75000"/>
-              </a:schemeClr>
-            </a:solidFill>
-            <a:prstDash val="sysDot"/>
-            <a:headEnd type="none" w="med" len="med"/>
-            <a:tailEnd type="arrow" w="med" len="med"/>
-          </a:ln>
-          <a:effectLst/>
-        </p:spPr>
-        <p:style>
-          <a:lnRef idx="1">
-            <a:schemeClr val="accent2"/>
-          </a:lnRef>
-          <a:fillRef idx="2">
-            <a:schemeClr val="accent2"/>
-          </a:fillRef>
-          <a:effectRef idx="1">
-            <a:schemeClr val="accent2"/>
-          </a:effectRef>
-          <a:fontRef idx="minor">
-            <a:schemeClr val="dk1"/>
-          </a:fontRef>
-        </p:style>
-      </p:cxnSp>
-      <p:cxnSp>
-        <p:nvCxnSpPr>
-          <p:cNvPr id="113" name="Elbow Connector 63"/>
-          <p:cNvCxnSpPr>
-            <a:stCxn id="16" idx="3"/>
-            <a:endCxn id="44" idx="3"/>
-          </p:cNvCxnSpPr>
-          <p:nvPr/>
-        </p:nvCxnSpPr>
-        <p:spPr>
-          <a:xfrm flipV="1">
-            <a:off x="4114800" y="2728717"/>
-            <a:ext cx="549792" cy="1220165"/>
-          </a:xfrm>
-          <a:prstGeom prst="bentConnector3">
-            <a:avLst>
-              <a:gd name="adj1" fmla="val 14720"/>
-            </a:avLst>
-          </a:prstGeom>
-          <a:ln w="19050">
-            <a:solidFill>
-              <a:schemeClr val="accent5">
-                <a:lumMod val="75000"/>
-              </a:schemeClr>
-            </a:solidFill>
-            <a:prstDash val="sysDot"/>
-            <a:headEnd type="none" w="med" len="med"/>
-            <a:tailEnd type="arrow" w="med" len="med"/>
-          </a:ln>
-          <a:effectLst/>
-        </p:spPr>
-        <p:style>
-          <a:lnRef idx="1">
-            <a:schemeClr val="accent2"/>
-          </a:lnRef>
-          <a:fillRef idx="2">
-            <a:schemeClr val="accent2"/>
-          </a:fillRef>
-          <a:effectRef idx="1">
-            <a:schemeClr val="accent2"/>
-          </a:effectRef>
-          <a:fontRef idx="minor">
-            <a:schemeClr val="dk1"/>
-          </a:fontRef>
-        </p:style>
-      </p:cxnSp>
-      <p:cxnSp>
-        <p:nvCxnSpPr>
-          <p:cNvPr id="116" name="Elbow Connector 63"/>
-          <p:cNvCxnSpPr>
-            <a:stCxn id="16" idx="3"/>
-            <a:endCxn id="42" idx="3"/>
-          </p:cNvCxnSpPr>
-          <p:nvPr/>
-        </p:nvCxnSpPr>
-        <p:spPr>
-          <a:xfrm flipV="1">
-            <a:off x="4114800" y="2322317"/>
-            <a:ext cx="549792" cy="1626565"/>
-          </a:xfrm>
-          <a:prstGeom prst="bentConnector3">
-            <a:avLst>
-              <a:gd name="adj1" fmla="val 14721"/>
-            </a:avLst>
-          </a:prstGeom>
-          <a:ln w="19050">
-            <a:solidFill>
-              <a:schemeClr val="accent5">
-                <a:lumMod val="75000"/>
-              </a:schemeClr>
-            </a:solidFill>
-            <a:prstDash val="sysDot"/>
-            <a:headEnd type="none" w="med" len="med"/>
-            <a:tailEnd type="arrow" w="med" len="med"/>
-          </a:ln>
-          <a:effectLst/>
-        </p:spPr>
-        <p:style>
-          <a:lnRef idx="1">
-            <a:schemeClr val="accent2"/>
-          </a:lnRef>
-          <a:fillRef idx="2">
-            <a:schemeClr val="accent2"/>
-          </a:fillRef>
-          <a:effectRef idx="1">
-            <a:schemeClr val="accent2"/>
-          </a:effectRef>
-          <a:fontRef idx="minor">
-            <a:schemeClr val="dk1"/>
-          </a:fontRef>
-        </p:style>
-      </p:cxnSp>
-      <p:cxnSp>
-        <p:nvCxnSpPr>
-          <p:cNvPr id="120" name="Elbow Connector 63"/>
-          <p:cNvCxnSpPr>
-            <a:stCxn id="44" idx="1"/>
-            <a:endCxn id="10" idx="3"/>
-          </p:cNvCxnSpPr>
-          <p:nvPr/>
-        </p:nvCxnSpPr>
-        <p:spPr>
-          <a:xfrm flipV="1">
-            <a:off x="5758227" y="2728300"/>
-            <a:ext cx="768138" cy="417"/>
+            <a:off x="3839361" y="1880112"/>
+            <a:ext cx="586279" cy="2766524"/>
           </a:xfrm>
           <a:prstGeom prst="bentConnector3">
             <a:avLst>
@@ -6240,17 +6161,17 @@
       </p:cxnSp>
       <p:cxnSp>
         <p:nvCxnSpPr>
-          <p:cNvPr id="122" name="Elbow Connector 63"/>
+          <p:cNvPr id="113" name="Elbow Connector 63"/>
           <p:cNvCxnSpPr>
-            <a:stCxn id="42" idx="1"/>
-            <a:endCxn id="4" idx="3"/>
+            <a:stCxn id="16" idx="3"/>
+            <a:endCxn id="44" idx="3"/>
           </p:cNvCxnSpPr>
           <p:nvPr/>
         </p:nvCxnSpPr>
         <p:spPr>
-          <a:xfrm>
-            <a:off x="5758227" y="2322317"/>
-            <a:ext cx="762000" cy="230"/>
+          <a:xfrm flipV="1">
+            <a:off x="3839361" y="1457867"/>
+            <a:ext cx="586281" cy="3188769"/>
           </a:xfrm>
           <a:prstGeom prst="bentConnector3">
             <a:avLst>
@@ -6286,13 +6207,151 @@
       </p:cxnSp>
       <p:cxnSp>
         <p:nvCxnSpPr>
+          <p:cNvPr id="116" name="Elbow Connector 63"/>
+          <p:cNvCxnSpPr>
+            <a:stCxn id="16" idx="3"/>
+            <a:endCxn id="42" idx="3"/>
+          </p:cNvCxnSpPr>
+          <p:nvPr/>
+        </p:nvCxnSpPr>
+        <p:spPr>
+          <a:xfrm flipV="1">
+            <a:off x="3839361" y="1051467"/>
+            <a:ext cx="586281" cy="3595169"/>
+          </a:xfrm>
+          <a:prstGeom prst="bentConnector3">
+            <a:avLst>
+              <a:gd name="adj1" fmla="val 50000"/>
+            </a:avLst>
+          </a:prstGeom>
+          <a:ln w="19050">
+            <a:solidFill>
+              <a:schemeClr val="accent5">
+                <a:lumMod val="75000"/>
+              </a:schemeClr>
+            </a:solidFill>
+            <a:prstDash val="sysDot"/>
+            <a:headEnd type="none" w="med" len="med"/>
+            <a:tailEnd type="arrow" w="med" len="med"/>
+          </a:ln>
+          <a:effectLst/>
+        </p:spPr>
+        <p:style>
+          <a:lnRef idx="1">
+            <a:schemeClr val="accent2"/>
+          </a:lnRef>
+          <a:fillRef idx="2">
+            <a:schemeClr val="accent2"/>
+          </a:fillRef>
+          <a:effectRef idx="1">
+            <a:schemeClr val="accent2"/>
+          </a:effectRef>
+          <a:fontRef idx="minor">
+            <a:schemeClr val="dk1"/>
+          </a:fontRef>
+        </p:style>
+      </p:cxnSp>
+      <p:cxnSp>
+        <p:nvCxnSpPr>
+          <p:cNvPr id="120" name="Elbow Connector 63"/>
+          <p:cNvCxnSpPr>
+            <a:stCxn id="44" idx="1"/>
+            <a:endCxn id="10" idx="3"/>
+          </p:cNvCxnSpPr>
+          <p:nvPr/>
+        </p:nvCxnSpPr>
+        <p:spPr>
+          <a:xfrm>
+            <a:off x="5519277" y="1457867"/>
+            <a:ext cx="652923" cy="956"/>
+          </a:xfrm>
+          <a:prstGeom prst="bentConnector3">
+            <a:avLst>
+              <a:gd name="adj1" fmla="val 50000"/>
+            </a:avLst>
+          </a:prstGeom>
+          <a:ln w="19050">
+            <a:solidFill>
+              <a:schemeClr val="accent5">
+                <a:lumMod val="75000"/>
+              </a:schemeClr>
+            </a:solidFill>
+            <a:prstDash val="sysDot"/>
+            <a:headEnd type="none" w="med" len="med"/>
+            <a:tailEnd type="arrow" w="med" len="med"/>
+          </a:ln>
+          <a:effectLst/>
+        </p:spPr>
+        <p:style>
+          <a:lnRef idx="1">
+            <a:schemeClr val="accent2"/>
+          </a:lnRef>
+          <a:fillRef idx="2">
+            <a:schemeClr val="accent2"/>
+          </a:fillRef>
+          <a:effectRef idx="1">
+            <a:schemeClr val="accent2"/>
+          </a:effectRef>
+          <a:fontRef idx="minor">
+            <a:schemeClr val="dk1"/>
+          </a:fontRef>
+        </p:style>
+      </p:cxnSp>
+      <p:cxnSp>
+        <p:nvCxnSpPr>
+          <p:cNvPr id="122" name="Elbow Connector 63"/>
+          <p:cNvCxnSpPr>
+            <a:stCxn id="42" idx="1"/>
+            <a:endCxn id="4" idx="3"/>
+          </p:cNvCxnSpPr>
+          <p:nvPr/>
+        </p:nvCxnSpPr>
+        <p:spPr>
+          <a:xfrm flipV="1">
+            <a:off x="5519277" y="1050143"/>
+            <a:ext cx="656293" cy="1324"/>
+          </a:xfrm>
+          <a:prstGeom prst="bentConnector3">
+            <a:avLst>
+              <a:gd name="adj1" fmla="val 50000"/>
+            </a:avLst>
+          </a:prstGeom>
+          <a:ln w="19050">
+            <a:solidFill>
+              <a:schemeClr val="accent5">
+                <a:lumMod val="75000"/>
+              </a:schemeClr>
+            </a:solidFill>
+            <a:prstDash val="sysDot"/>
+            <a:headEnd type="none" w="med" len="med"/>
+            <a:tailEnd type="arrow" w="med" len="med"/>
+          </a:ln>
+          <a:effectLst/>
+        </p:spPr>
+        <p:style>
+          <a:lnRef idx="1">
+            <a:schemeClr val="accent2"/>
+          </a:lnRef>
+          <a:fillRef idx="2">
+            <a:schemeClr val="accent2"/>
+          </a:fillRef>
+          <a:effectRef idx="1">
+            <a:schemeClr val="accent2"/>
+          </a:effectRef>
+          <a:fontRef idx="minor">
+            <a:schemeClr val="dk1"/>
+          </a:fontRef>
+        </p:style>
+      </p:cxnSp>
+      <p:cxnSp>
+        <p:nvCxnSpPr>
           <p:cNvPr id="64" name="Straight Connector 63"/>
           <p:cNvCxnSpPr/>
           <p:nvPr/>
         </p:nvCxnSpPr>
         <p:spPr>
           <a:xfrm>
-            <a:off x="3886200" y="2078487"/>
+            <a:off x="3657600" y="1316487"/>
             <a:ext cx="0" cy="1218984"/>
           </a:xfrm>
           <a:prstGeom prst="line">
@@ -6333,7 +6392,7 @@
         </p:nvCxnSpPr>
         <p:spPr>
           <a:xfrm>
-            <a:off x="3894672" y="2209800"/>
+            <a:off x="3666072" y="1447800"/>
             <a:ext cx="769918" cy="0"/>
           </a:xfrm>
           <a:prstGeom prst="line">
@@ -6374,7 +6433,7 @@
         </p:nvCxnSpPr>
         <p:spPr>
           <a:xfrm>
-            <a:off x="3886200" y="2607244"/>
+            <a:off x="3657600" y="1845244"/>
             <a:ext cx="769918" cy="0"/>
           </a:xfrm>
           <a:prstGeom prst="line">
@@ -6407,18 +6466,1111 @@
           </a:fontRef>
         </p:style>
       </p:cxnSp>
+      <p:grpSp>
+        <p:nvGrpSpPr>
+          <p:cNvPr id="80" name="Group 79"/>
+          <p:cNvGrpSpPr/>
+          <p:nvPr/>
+        </p:nvGrpSpPr>
+        <p:grpSpPr>
+          <a:xfrm rot="5400000">
+            <a:off x="5747191" y="1512110"/>
+            <a:ext cx="254462" cy="555486"/>
+            <a:chOff x="3949242" y="712012"/>
+            <a:chExt cx="254462" cy="503902"/>
+          </a:xfrm>
+        </p:grpSpPr>
+        <p:sp>
+          <p:nvSpPr>
+            <p:cNvPr id="81" name="TextBox 80"/>
+            <p:cNvSpPr txBox="1"/>
+            <p:nvPr/>
+          </p:nvSpPr>
+          <p:spPr>
+            <a:xfrm rot="16200000">
+              <a:off x="3824522" y="836732"/>
+              <a:ext cx="503902" cy="254462"/>
+            </a:xfrm>
+            <a:prstGeom prst="rect">
+              <a:avLst/>
+            </a:prstGeom>
+            <a:noFill/>
+          </p:spPr>
+          <p:txBody>
+            <a:bodyPr wrap="square" lIns="0" tIns="0" rIns="0" bIns="0" rtlCol="0">
+              <a:noAutofit/>
+            </a:bodyPr>
+            <a:lstStyle/>
+            <a:p>
+              <a:r>
+                <a:rPr lang="en-US" sz="1100" dirty="0" smtClean="0">
+                  <a:solidFill>
+                    <a:schemeClr val="accent5">
+                      <a:lumMod val="75000"/>
+                    </a:schemeClr>
+                  </a:solidFill>
+                </a:rPr>
+                <a:t>creates</a:t>
+              </a:r>
+              <a:endParaRPr lang="en-SG" sz="1100" dirty="0">
+                <a:solidFill>
+                  <a:schemeClr val="accent5">
+                    <a:lumMod val="75000"/>
+                  </a:schemeClr>
+                </a:solidFill>
+              </a:endParaRPr>
+            </a:p>
+          </p:txBody>
+        </p:sp>
+        <p:sp>
+          <p:nvSpPr>
+            <p:cNvPr id="82" name="Isosceles Triangle 81"/>
+            <p:cNvSpPr/>
+            <p:nvPr/>
+          </p:nvSpPr>
+          <p:spPr>
+            <a:xfrm rot="10800000" flipV="1">
+              <a:off x="3979474" y="751200"/>
+              <a:ext cx="132157" cy="79956"/>
+            </a:xfrm>
+            <a:prstGeom prst="triangle">
+              <a:avLst/>
+            </a:prstGeom>
+            <a:solidFill>
+              <a:schemeClr val="accent5">
+                <a:lumMod val="75000"/>
+              </a:schemeClr>
+            </a:solidFill>
+            <a:ln>
+              <a:noFill/>
+            </a:ln>
+          </p:spPr>
+          <p:style>
+            <a:lnRef idx="2">
+              <a:schemeClr val="accent1">
+                <a:shade val="50000"/>
+              </a:schemeClr>
+            </a:lnRef>
+            <a:fillRef idx="1">
+              <a:schemeClr val="accent1"/>
+            </a:fillRef>
+            <a:effectRef idx="0">
+              <a:schemeClr val="accent1"/>
+            </a:effectRef>
+            <a:fontRef idx="minor">
+              <a:schemeClr val="lt1"/>
+            </a:fontRef>
+          </p:style>
+          <p:txBody>
+            <a:bodyPr rtlCol="0" anchor="ctr"/>
+            <a:lstStyle/>
+            <a:p>
+              <a:pPr algn="ctr"/>
+              <a:endParaRPr lang="en-SG"/>
+            </a:p>
+          </p:txBody>
+        </p:sp>
+      </p:grpSp>
       <p:cxnSp>
         <p:nvCxnSpPr>
-          <p:cNvPr id="74" name="Straight Connector 73"/>
-          <p:cNvCxnSpPr/>
+          <p:cNvPr id="83" name="Elbow Connector 63"/>
+          <p:cNvCxnSpPr>
+            <a:endCxn id="37" idx="3"/>
+          </p:cNvCxnSpPr>
           <p:nvPr/>
         </p:nvCxnSpPr>
         <p:spPr>
           <a:xfrm>
-            <a:off x="3886200" y="3048000"/>
-            <a:ext cx="769918" cy="0"/>
-          </a:xfrm>
-          <a:prstGeom prst="line">
+            <a:off x="5436858" y="1885639"/>
+            <a:ext cx="744850" cy="4767"/>
+          </a:xfrm>
+          <a:prstGeom prst="bentConnector3">
+            <a:avLst>
+              <a:gd name="adj1" fmla="val 50000"/>
+            </a:avLst>
+          </a:prstGeom>
+          <a:ln w="19050">
+            <a:solidFill>
+              <a:schemeClr val="accent5">
+                <a:lumMod val="75000"/>
+              </a:schemeClr>
+            </a:solidFill>
+            <a:prstDash val="sysDot"/>
+            <a:headEnd type="none" w="med" len="med"/>
+            <a:tailEnd type="arrow" w="med" len="med"/>
+          </a:ln>
+          <a:effectLst/>
+        </p:spPr>
+        <p:style>
+          <a:lnRef idx="1">
+            <a:schemeClr val="accent2"/>
+          </a:lnRef>
+          <a:fillRef idx="2">
+            <a:schemeClr val="accent2"/>
+          </a:fillRef>
+          <a:effectRef idx="1">
+            <a:schemeClr val="accent2"/>
+          </a:effectRef>
+          <a:fontRef idx="minor">
+            <a:schemeClr val="dk1"/>
+          </a:fontRef>
+        </p:style>
+      </p:cxnSp>
+      <p:sp>
+        <p:nvSpPr>
+          <p:cNvPr id="85" name="Rectangle 11"/>
+          <p:cNvSpPr/>
+          <p:nvPr/>
+        </p:nvSpPr>
+        <p:spPr>
+          <a:xfrm flipH="1">
+            <a:off x="6172200" y="2104929"/>
+            <a:ext cx="1093635" cy="301966"/>
+          </a:xfrm>
+          <a:prstGeom prst="rect">
+            <a:avLst/>
+          </a:prstGeom>
+          <a:ln w="19050">
+            <a:solidFill>
+              <a:srgbClr val="0070C0"/>
+            </a:solidFill>
+          </a:ln>
+          <a:effectLst/>
+        </p:spPr>
+        <p:style>
+          <a:lnRef idx="1">
+            <a:schemeClr val="accent1"/>
+          </a:lnRef>
+          <a:fillRef idx="2">
+            <a:schemeClr val="accent1"/>
+          </a:fillRef>
+          <a:effectRef idx="1">
+            <a:schemeClr val="accent1"/>
+          </a:effectRef>
+          <a:fontRef idx="minor">
+            <a:schemeClr val="dk1"/>
+          </a:fontRef>
+        </p:style>
+        <p:txBody>
+          <a:bodyPr rtlCol="0" anchor="ctr"/>
+          <a:lstStyle/>
+          <a:p>
+            <a:pPr algn="ctr"/>
+            <a:r>
+              <a:rPr lang="en-US" sz="1050" b="1" dirty="0" err="1" smtClean="0">
+                <a:solidFill>
+                  <a:srgbClr val="0070C0"/>
+                </a:solidFill>
+              </a:rPr>
+              <a:t>ViewOn</a:t>
+            </a:r>
+            <a:endParaRPr lang="en-US" sz="1050" b="1" dirty="0" smtClean="0">
+              <a:solidFill>
+                <a:srgbClr val="0070C0"/>
+              </a:solidFill>
+            </a:endParaRPr>
+          </a:p>
+          <a:p>
+            <a:pPr algn="ctr"/>
+            <a:r>
+              <a:rPr lang="en-US" sz="1050" b="1" dirty="0" smtClean="0">
+                <a:solidFill>
+                  <a:srgbClr val="0070C0"/>
+                </a:solidFill>
+              </a:rPr>
+              <a:t>Command</a:t>
+            </a:r>
+            <a:endParaRPr lang="en-SG" sz="1050" b="1" dirty="0">
+              <a:solidFill>
+                <a:srgbClr val="0070C0"/>
+              </a:solidFill>
+            </a:endParaRPr>
+          </a:p>
+        </p:txBody>
+      </p:sp>
+      <p:cxnSp>
+        <p:nvCxnSpPr>
+          <p:cNvPr id="86" name="Elbow Connector 85"/>
+          <p:cNvCxnSpPr>
+            <a:stCxn id="87" idx="3"/>
+            <a:endCxn id="85" idx="1"/>
+          </p:cNvCxnSpPr>
+          <p:nvPr/>
+        </p:nvCxnSpPr>
+        <p:spPr>
+          <a:xfrm rot="16200000" flipV="1">
+            <a:off x="6196171" y="3325577"/>
+            <a:ext cx="2422317" cy="282988"/>
+          </a:xfrm>
+          <a:prstGeom prst="bentConnector2">
+            <a:avLst/>
+          </a:prstGeom>
+          <a:ln w="19050">
+            <a:headEnd type="none" w="med" len="med"/>
+            <a:tailEnd type="none" w="med" len="med"/>
+          </a:ln>
+        </p:spPr>
+        <p:style>
+          <a:lnRef idx="1">
+            <a:schemeClr val="accent1"/>
+          </a:lnRef>
+          <a:fillRef idx="0">
+            <a:schemeClr val="accent1"/>
+          </a:fillRef>
+          <a:effectRef idx="0">
+            <a:schemeClr val="accent1"/>
+          </a:effectRef>
+          <a:fontRef idx="minor">
+            <a:schemeClr val="tx1"/>
+          </a:fontRef>
+        </p:style>
+      </p:cxnSp>
+      <p:cxnSp>
+        <p:nvCxnSpPr>
+          <p:cNvPr id="88" name="Elbow Connector 63"/>
+          <p:cNvCxnSpPr>
+            <a:stCxn id="45" idx="1"/>
+            <a:endCxn id="85" idx="3"/>
+          </p:cNvCxnSpPr>
+          <p:nvPr/>
+        </p:nvCxnSpPr>
+        <p:spPr>
+          <a:xfrm>
+            <a:off x="5519275" y="1880112"/>
+            <a:ext cx="652925" cy="375800"/>
+          </a:xfrm>
+          <a:prstGeom prst="bentConnector3">
+            <a:avLst>
+              <a:gd name="adj1" fmla="val 50000"/>
+            </a:avLst>
+          </a:prstGeom>
+          <a:ln w="19050">
+            <a:solidFill>
+              <a:schemeClr val="accent5">
+                <a:lumMod val="75000"/>
+              </a:schemeClr>
+            </a:solidFill>
+            <a:prstDash val="sysDot"/>
+            <a:headEnd type="none" w="med" len="med"/>
+            <a:tailEnd type="arrow" w="med" len="med"/>
+          </a:ln>
+          <a:effectLst/>
+        </p:spPr>
+        <p:style>
+          <a:lnRef idx="1">
+            <a:schemeClr val="accent2"/>
+          </a:lnRef>
+          <a:fillRef idx="2">
+            <a:schemeClr val="accent2"/>
+          </a:fillRef>
+          <a:effectRef idx="1">
+            <a:schemeClr val="accent2"/>
+          </a:effectRef>
+          <a:fontRef idx="minor">
+            <a:schemeClr val="dk1"/>
+          </a:fontRef>
+        </p:style>
+      </p:cxnSp>
+      <p:sp>
+        <p:nvSpPr>
+          <p:cNvPr id="91" name="Rectangle 90"/>
+          <p:cNvSpPr/>
+          <p:nvPr/>
+        </p:nvSpPr>
+        <p:spPr>
+          <a:xfrm flipH="1">
+            <a:off x="4432386" y="3063089"/>
+            <a:ext cx="1093635" cy="312836"/>
+          </a:xfrm>
+          <a:prstGeom prst="rect">
+            <a:avLst/>
+          </a:prstGeom>
+          <a:solidFill>
+            <a:schemeClr val="accent5"/>
+          </a:solidFill>
+          <a:ln/>
+          <a:effectLst/>
+        </p:spPr>
+        <p:style>
+          <a:lnRef idx="1">
+            <a:schemeClr val="accent5"/>
+          </a:lnRef>
+          <a:fillRef idx="2">
+            <a:schemeClr val="accent5"/>
+          </a:fillRef>
+          <a:effectRef idx="1">
+            <a:schemeClr val="accent5"/>
+          </a:effectRef>
+          <a:fontRef idx="minor">
+            <a:schemeClr val="dk1"/>
+          </a:fontRef>
+        </p:style>
+        <p:txBody>
+          <a:bodyPr rtlCol="0" anchor="ctr"/>
+          <a:lstStyle/>
+          <a:p>
+            <a:pPr algn="ctr"/>
+            <a:r>
+              <a:rPr lang="en-US" sz="1050" b="1" dirty="0" err="1" smtClean="0">
+                <a:solidFill>
+                  <a:schemeClr val="bg1"/>
+                </a:solidFill>
+              </a:rPr>
+              <a:t>ListCommand</a:t>
+            </a:r>
+            <a:endParaRPr lang="en-US" sz="1050" b="1" dirty="0">
+              <a:solidFill>
+                <a:schemeClr val="bg1"/>
+              </a:solidFill>
+            </a:endParaRPr>
+          </a:p>
+          <a:p>
+            <a:pPr algn="ctr"/>
+            <a:r>
+              <a:rPr lang="en-US" sz="1050" b="1" dirty="0" smtClean="0">
+                <a:solidFill>
+                  <a:schemeClr val="bg1"/>
+                </a:solidFill>
+              </a:rPr>
+              <a:t>Parser</a:t>
+            </a:r>
+            <a:endParaRPr lang="en-SG" sz="1050" b="1" dirty="0">
+              <a:solidFill>
+                <a:schemeClr val="bg1"/>
+              </a:solidFill>
+            </a:endParaRPr>
+          </a:p>
+        </p:txBody>
+      </p:sp>
+      <p:cxnSp>
+        <p:nvCxnSpPr>
+          <p:cNvPr id="99" name="Elbow Connector 63"/>
+          <p:cNvCxnSpPr>
+            <a:stCxn id="16" idx="3"/>
+            <a:endCxn id="91" idx="3"/>
+          </p:cNvCxnSpPr>
+          <p:nvPr/>
+        </p:nvCxnSpPr>
+        <p:spPr>
+          <a:xfrm flipV="1">
+            <a:off x="3839361" y="3219507"/>
+            <a:ext cx="593025" cy="1427129"/>
+          </a:xfrm>
+          <a:prstGeom prst="bentConnector3">
+            <a:avLst>
+              <a:gd name="adj1" fmla="val 50000"/>
+            </a:avLst>
+          </a:prstGeom>
+          <a:ln w="19050">
+            <a:solidFill>
+              <a:schemeClr val="accent5">
+                <a:lumMod val="75000"/>
+              </a:schemeClr>
+            </a:solidFill>
+            <a:prstDash val="sysDot"/>
+            <a:headEnd type="none" w="med" len="med"/>
+            <a:tailEnd type="arrow" w="med" len="med"/>
+          </a:ln>
+          <a:effectLst/>
+        </p:spPr>
+        <p:style>
+          <a:lnRef idx="1">
+            <a:schemeClr val="accent2"/>
+          </a:lnRef>
+          <a:fillRef idx="2">
+            <a:schemeClr val="accent2"/>
+          </a:fillRef>
+          <a:effectRef idx="1">
+            <a:schemeClr val="accent2"/>
+          </a:effectRef>
+          <a:fontRef idx="minor">
+            <a:schemeClr val="dk1"/>
+          </a:fontRef>
+        </p:style>
+      </p:cxnSp>
+      <p:sp>
+        <p:nvSpPr>
+          <p:cNvPr id="134" name="Rectangle 11"/>
+          <p:cNvSpPr/>
+          <p:nvPr/>
+        </p:nvSpPr>
+        <p:spPr>
+          <a:xfrm flipH="1">
+            <a:off x="6181708" y="2493152"/>
+            <a:ext cx="1093635" cy="301966"/>
+          </a:xfrm>
+          <a:prstGeom prst="rect">
+            <a:avLst/>
+          </a:prstGeom>
+          <a:ln w="19050">
+            <a:solidFill>
+              <a:srgbClr val="0070C0"/>
+            </a:solidFill>
+          </a:ln>
+          <a:effectLst/>
+        </p:spPr>
+        <p:style>
+          <a:lnRef idx="1">
+            <a:schemeClr val="accent1"/>
+          </a:lnRef>
+          <a:fillRef idx="2">
+            <a:schemeClr val="accent1"/>
+          </a:fillRef>
+          <a:effectRef idx="1">
+            <a:schemeClr val="accent1"/>
+          </a:effectRef>
+          <a:fontRef idx="minor">
+            <a:schemeClr val="dk1"/>
+          </a:fontRef>
+        </p:style>
+        <p:txBody>
+          <a:bodyPr rtlCol="0" anchor="ctr"/>
+          <a:lstStyle/>
+          <a:p>
+            <a:pPr algn="ctr"/>
+            <a:r>
+              <a:rPr lang="en-US" sz="1050" b="1" dirty="0" err="1" smtClean="0">
+                <a:solidFill>
+                  <a:srgbClr val="0070C0"/>
+                </a:solidFill>
+              </a:rPr>
+              <a:t>ListCommand</a:t>
+            </a:r>
+            <a:endParaRPr lang="en-SG" sz="1050" b="1" dirty="0">
+              <a:solidFill>
+                <a:srgbClr val="0070C0"/>
+              </a:solidFill>
+            </a:endParaRPr>
+          </a:p>
+        </p:txBody>
+      </p:sp>
+      <p:sp>
+        <p:nvSpPr>
+          <p:cNvPr id="135" name="Rectangle 11"/>
+          <p:cNvSpPr/>
+          <p:nvPr/>
+        </p:nvSpPr>
+        <p:spPr>
+          <a:xfrm flipH="1">
+            <a:off x="6181707" y="2859265"/>
+            <a:ext cx="1093635" cy="301966"/>
+          </a:xfrm>
+          <a:prstGeom prst="rect">
+            <a:avLst/>
+          </a:prstGeom>
+          <a:ln w="19050">
+            <a:solidFill>
+              <a:srgbClr val="0070C0"/>
+            </a:solidFill>
+          </a:ln>
+          <a:effectLst/>
+        </p:spPr>
+        <p:style>
+          <a:lnRef idx="1">
+            <a:schemeClr val="accent1"/>
+          </a:lnRef>
+          <a:fillRef idx="2">
+            <a:schemeClr val="accent1"/>
+          </a:fillRef>
+          <a:effectRef idx="1">
+            <a:schemeClr val="accent1"/>
+          </a:effectRef>
+          <a:fontRef idx="minor">
+            <a:schemeClr val="dk1"/>
+          </a:fontRef>
+        </p:style>
+        <p:txBody>
+          <a:bodyPr rtlCol="0" anchor="ctr"/>
+          <a:lstStyle/>
+          <a:p>
+            <a:pPr algn="ctr"/>
+            <a:r>
+              <a:rPr lang="en-US" sz="1050" b="1" dirty="0" err="1" smtClean="0">
+                <a:solidFill>
+                  <a:srgbClr val="0070C0"/>
+                </a:solidFill>
+              </a:rPr>
+              <a:t>ListAll</a:t>
+            </a:r>
+            <a:endParaRPr lang="en-US" sz="1050" b="1" dirty="0" smtClean="0">
+              <a:solidFill>
+                <a:srgbClr val="0070C0"/>
+              </a:solidFill>
+            </a:endParaRPr>
+          </a:p>
+          <a:p>
+            <a:pPr algn="ctr"/>
+            <a:r>
+              <a:rPr lang="en-US" sz="1050" b="1" dirty="0" smtClean="0">
+                <a:solidFill>
+                  <a:srgbClr val="0070C0"/>
+                </a:solidFill>
+              </a:rPr>
+              <a:t>Command</a:t>
+            </a:r>
+            <a:endParaRPr lang="en-SG" sz="1050" b="1" dirty="0">
+              <a:solidFill>
+                <a:srgbClr val="0070C0"/>
+              </a:solidFill>
+            </a:endParaRPr>
+          </a:p>
+        </p:txBody>
+      </p:sp>
+      <p:sp>
+        <p:nvSpPr>
+          <p:cNvPr id="136" name="Rectangle 11"/>
+          <p:cNvSpPr/>
+          <p:nvPr/>
+        </p:nvSpPr>
+        <p:spPr>
+          <a:xfrm flipH="1">
+            <a:off x="6174821" y="3233410"/>
+            <a:ext cx="1093635" cy="301966"/>
+          </a:xfrm>
+          <a:prstGeom prst="rect">
+            <a:avLst/>
+          </a:prstGeom>
+          <a:ln w="19050">
+            <a:solidFill>
+              <a:srgbClr val="0070C0"/>
+            </a:solidFill>
+          </a:ln>
+          <a:effectLst/>
+        </p:spPr>
+        <p:style>
+          <a:lnRef idx="1">
+            <a:schemeClr val="accent1"/>
+          </a:lnRef>
+          <a:fillRef idx="2">
+            <a:schemeClr val="accent1"/>
+          </a:fillRef>
+          <a:effectRef idx="1">
+            <a:schemeClr val="accent1"/>
+          </a:effectRef>
+          <a:fontRef idx="minor">
+            <a:schemeClr val="dk1"/>
+          </a:fontRef>
+        </p:style>
+        <p:txBody>
+          <a:bodyPr rtlCol="0" anchor="ctr"/>
+          <a:lstStyle/>
+          <a:p>
+            <a:pPr algn="ctr"/>
+            <a:r>
+              <a:rPr lang="en-US" sz="1050" b="1" dirty="0" err="1" smtClean="0">
+                <a:solidFill>
+                  <a:srgbClr val="0070C0"/>
+                </a:solidFill>
+              </a:rPr>
+              <a:t>ListFinished</a:t>
+            </a:r>
+            <a:endParaRPr lang="en-US" sz="1050" b="1" dirty="0" smtClean="0">
+              <a:solidFill>
+                <a:srgbClr val="0070C0"/>
+              </a:solidFill>
+            </a:endParaRPr>
+          </a:p>
+          <a:p>
+            <a:pPr algn="ctr"/>
+            <a:r>
+              <a:rPr lang="en-US" sz="1050" b="1" dirty="0" smtClean="0">
+                <a:solidFill>
+                  <a:srgbClr val="0070C0"/>
+                </a:solidFill>
+              </a:rPr>
+              <a:t>Command</a:t>
+            </a:r>
+            <a:endParaRPr lang="en-SG" sz="1050" b="1" dirty="0">
+              <a:solidFill>
+                <a:srgbClr val="0070C0"/>
+              </a:solidFill>
+            </a:endParaRPr>
+          </a:p>
+        </p:txBody>
+      </p:sp>
+      <p:sp>
+        <p:nvSpPr>
+          <p:cNvPr id="137" name="Rectangle 11"/>
+          <p:cNvSpPr/>
+          <p:nvPr/>
+        </p:nvSpPr>
+        <p:spPr>
+          <a:xfrm flipH="1">
+            <a:off x="6173696" y="3610308"/>
+            <a:ext cx="1093635" cy="301966"/>
+          </a:xfrm>
+          <a:prstGeom prst="rect">
+            <a:avLst/>
+          </a:prstGeom>
+          <a:ln w="19050">
+            <a:solidFill>
+              <a:srgbClr val="0070C0"/>
+            </a:solidFill>
+          </a:ln>
+          <a:effectLst/>
+        </p:spPr>
+        <p:style>
+          <a:lnRef idx="1">
+            <a:schemeClr val="accent1"/>
+          </a:lnRef>
+          <a:fillRef idx="2">
+            <a:schemeClr val="accent1"/>
+          </a:fillRef>
+          <a:effectRef idx="1">
+            <a:schemeClr val="accent1"/>
+          </a:effectRef>
+          <a:fontRef idx="minor">
+            <a:schemeClr val="dk1"/>
+          </a:fontRef>
+        </p:style>
+        <p:txBody>
+          <a:bodyPr rtlCol="0" anchor="ctr"/>
+          <a:lstStyle/>
+          <a:p>
+            <a:pPr algn="ctr"/>
+            <a:r>
+              <a:rPr lang="en-US" sz="1050" b="1" dirty="0" err="1" smtClean="0">
+                <a:solidFill>
+                  <a:srgbClr val="0070C0"/>
+                </a:solidFill>
+              </a:rPr>
+              <a:t>ListFavorite</a:t>
+            </a:r>
+            <a:endParaRPr lang="en-US" sz="1050" b="1" dirty="0" smtClean="0">
+              <a:solidFill>
+                <a:srgbClr val="0070C0"/>
+              </a:solidFill>
+            </a:endParaRPr>
+          </a:p>
+          <a:p>
+            <a:pPr algn="ctr"/>
+            <a:r>
+              <a:rPr lang="en-US" sz="1050" b="1" dirty="0" smtClean="0">
+                <a:solidFill>
+                  <a:srgbClr val="0070C0"/>
+                </a:solidFill>
+              </a:rPr>
+              <a:t>Command</a:t>
+            </a:r>
+            <a:endParaRPr lang="en-SG" sz="1050" b="1" dirty="0">
+              <a:solidFill>
+                <a:srgbClr val="0070C0"/>
+              </a:solidFill>
+            </a:endParaRPr>
+          </a:p>
+        </p:txBody>
+      </p:sp>
+      <p:sp>
+        <p:nvSpPr>
+          <p:cNvPr id="160" name="Rectangle 11"/>
+          <p:cNvSpPr/>
+          <p:nvPr/>
+        </p:nvSpPr>
+        <p:spPr>
+          <a:xfrm flipH="1">
+            <a:off x="6181706" y="3969172"/>
+            <a:ext cx="1093635" cy="301966"/>
+          </a:xfrm>
+          <a:prstGeom prst="rect">
+            <a:avLst/>
+          </a:prstGeom>
+          <a:ln w="19050">
+            <a:solidFill>
+              <a:srgbClr val="0070C0"/>
+            </a:solidFill>
+          </a:ln>
+          <a:effectLst/>
+        </p:spPr>
+        <p:style>
+          <a:lnRef idx="1">
+            <a:schemeClr val="accent1"/>
+          </a:lnRef>
+          <a:fillRef idx="2">
+            <a:schemeClr val="accent1"/>
+          </a:fillRef>
+          <a:effectRef idx="1">
+            <a:schemeClr val="accent1"/>
+          </a:effectRef>
+          <a:fontRef idx="minor">
+            <a:schemeClr val="dk1"/>
+          </a:fontRef>
+        </p:style>
+        <p:txBody>
+          <a:bodyPr rtlCol="0" anchor="ctr"/>
+          <a:lstStyle/>
+          <a:p>
+            <a:pPr algn="ctr"/>
+            <a:r>
+              <a:rPr lang="en-US" sz="1050" b="1" dirty="0" smtClean="0">
+                <a:solidFill>
+                  <a:srgbClr val="0070C0"/>
+                </a:solidFill>
+              </a:rPr>
+              <a:t>…</a:t>
+            </a:r>
+            <a:endParaRPr lang="en-SG" sz="1050" b="1" dirty="0">
+              <a:solidFill>
+                <a:srgbClr val="0070C0"/>
+              </a:solidFill>
+            </a:endParaRPr>
+          </a:p>
+        </p:txBody>
+      </p:sp>
+      <p:cxnSp>
+        <p:nvCxnSpPr>
+          <p:cNvPr id="167" name="Elbow Connector 63"/>
+          <p:cNvCxnSpPr>
+            <a:stCxn id="91" idx="1"/>
+            <a:endCxn id="134" idx="3"/>
+          </p:cNvCxnSpPr>
+          <p:nvPr/>
+        </p:nvCxnSpPr>
+        <p:spPr>
+          <a:xfrm flipV="1">
+            <a:off x="5526021" y="2644135"/>
+            <a:ext cx="655687" cy="575372"/>
+          </a:xfrm>
+          <a:prstGeom prst="bentConnector3">
+            <a:avLst>
+              <a:gd name="adj1" fmla="val 50000"/>
+            </a:avLst>
+          </a:prstGeom>
+          <a:ln w="19050">
+            <a:solidFill>
+              <a:schemeClr val="accent5">
+                <a:lumMod val="75000"/>
+              </a:schemeClr>
+            </a:solidFill>
+            <a:prstDash val="sysDot"/>
+            <a:headEnd type="none" w="med" len="med"/>
+            <a:tailEnd type="arrow" w="med" len="med"/>
+          </a:ln>
+          <a:effectLst/>
+        </p:spPr>
+        <p:style>
+          <a:lnRef idx="1">
+            <a:schemeClr val="accent2"/>
+          </a:lnRef>
+          <a:fillRef idx="2">
+            <a:schemeClr val="accent2"/>
+          </a:fillRef>
+          <a:effectRef idx="1">
+            <a:schemeClr val="accent2"/>
+          </a:effectRef>
+          <a:fontRef idx="minor">
+            <a:schemeClr val="dk1"/>
+          </a:fontRef>
+        </p:style>
+      </p:cxnSp>
+      <p:cxnSp>
+        <p:nvCxnSpPr>
+          <p:cNvPr id="168" name="Elbow Connector 63"/>
+          <p:cNvCxnSpPr>
+            <a:stCxn id="91" idx="1"/>
+            <a:endCxn id="135" idx="3"/>
+          </p:cNvCxnSpPr>
+          <p:nvPr/>
+        </p:nvCxnSpPr>
+        <p:spPr>
+          <a:xfrm flipV="1">
+            <a:off x="5526021" y="3010248"/>
+            <a:ext cx="655686" cy="209259"/>
+          </a:xfrm>
+          <a:prstGeom prst="bentConnector3">
+            <a:avLst>
+              <a:gd name="adj1" fmla="val 50000"/>
+            </a:avLst>
+          </a:prstGeom>
+          <a:ln w="19050">
+            <a:solidFill>
+              <a:schemeClr val="accent5">
+                <a:lumMod val="75000"/>
+              </a:schemeClr>
+            </a:solidFill>
+            <a:prstDash val="sysDot"/>
+            <a:headEnd type="none" w="med" len="med"/>
+            <a:tailEnd type="arrow" w="med" len="med"/>
+          </a:ln>
+          <a:effectLst/>
+        </p:spPr>
+        <p:style>
+          <a:lnRef idx="1">
+            <a:schemeClr val="accent2"/>
+          </a:lnRef>
+          <a:fillRef idx="2">
+            <a:schemeClr val="accent2"/>
+          </a:fillRef>
+          <a:effectRef idx="1">
+            <a:schemeClr val="accent2"/>
+          </a:effectRef>
+          <a:fontRef idx="minor">
+            <a:schemeClr val="dk1"/>
+          </a:fontRef>
+        </p:style>
+      </p:cxnSp>
+      <p:cxnSp>
+        <p:nvCxnSpPr>
+          <p:cNvPr id="169" name="Elbow Connector 63"/>
+          <p:cNvCxnSpPr>
+            <a:stCxn id="91" idx="1"/>
+            <a:endCxn id="136" idx="3"/>
+          </p:cNvCxnSpPr>
+          <p:nvPr/>
+        </p:nvCxnSpPr>
+        <p:spPr>
+          <a:xfrm>
+            <a:off x="5526021" y="3219507"/>
+            <a:ext cx="648800" cy="164886"/>
+          </a:xfrm>
+          <a:prstGeom prst="bentConnector3">
+            <a:avLst>
+              <a:gd name="adj1" fmla="val 50000"/>
+            </a:avLst>
+          </a:prstGeom>
+          <a:ln w="19050">
+            <a:solidFill>
+              <a:schemeClr val="accent5">
+                <a:lumMod val="75000"/>
+              </a:schemeClr>
+            </a:solidFill>
+            <a:prstDash val="sysDot"/>
+            <a:headEnd type="none" w="med" len="med"/>
+            <a:tailEnd type="arrow" w="med" len="med"/>
+          </a:ln>
+          <a:effectLst/>
+        </p:spPr>
+        <p:style>
+          <a:lnRef idx="1">
+            <a:schemeClr val="accent2"/>
+          </a:lnRef>
+          <a:fillRef idx="2">
+            <a:schemeClr val="accent2"/>
+          </a:fillRef>
+          <a:effectRef idx="1">
+            <a:schemeClr val="accent2"/>
+          </a:effectRef>
+          <a:fontRef idx="minor">
+            <a:schemeClr val="dk1"/>
+          </a:fontRef>
+        </p:style>
+      </p:cxnSp>
+      <p:cxnSp>
+        <p:nvCxnSpPr>
+          <p:cNvPr id="170" name="Elbow Connector 63"/>
+          <p:cNvCxnSpPr>
+            <a:stCxn id="91" idx="1"/>
+            <a:endCxn id="137" idx="3"/>
+          </p:cNvCxnSpPr>
+          <p:nvPr/>
+        </p:nvCxnSpPr>
+        <p:spPr>
+          <a:xfrm>
+            <a:off x="5526021" y="3219507"/>
+            <a:ext cx="647675" cy="541784"/>
+          </a:xfrm>
+          <a:prstGeom prst="bentConnector3">
+            <a:avLst>
+              <a:gd name="adj1" fmla="val 50000"/>
+            </a:avLst>
+          </a:prstGeom>
+          <a:ln w="19050">
+            <a:solidFill>
+              <a:schemeClr val="accent5">
+                <a:lumMod val="75000"/>
+              </a:schemeClr>
+            </a:solidFill>
+            <a:prstDash val="sysDot"/>
+            <a:headEnd type="none" w="med" len="med"/>
+            <a:tailEnd type="arrow" w="med" len="med"/>
+          </a:ln>
+          <a:effectLst/>
+        </p:spPr>
+        <p:style>
+          <a:lnRef idx="1">
+            <a:schemeClr val="accent2"/>
+          </a:lnRef>
+          <a:fillRef idx="2">
+            <a:schemeClr val="accent2"/>
+          </a:fillRef>
+          <a:effectRef idx="1">
+            <a:schemeClr val="accent2"/>
+          </a:effectRef>
+          <a:fontRef idx="minor">
+            <a:schemeClr val="dk1"/>
+          </a:fontRef>
+        </p:style>
+      </p:cxnSp>
+      <p:grpSp>
+        <p:nvGrpSpPr>
+          <p:cNvPr id="174" name="Group 173"/>
+          <p:cNvGrpSpPr/>
+          <p:nvPr/>
+        </p:nvGrpSpPr>
+        <p:grpSpPr>
+          <a:xfrm rot="5400000">
+            <a:off x="5508148" y="2562689"/>
+            <a:ext cx="254462" cy="555486"/>
+            <a:chOff x="3949242" y="712012"/>
+            <a:chExt cx="254462" cy="503902"/>
+          </a:xfrm>
+        </p:grpSpPr>
+        <p:sp>
+          <p:nvSpPr>
+            <p:cNvPr id="175" name="TextBox 174"/>
+            <p:cNvSpPr txBox="1"/>
+            <p:nvPr/>
+          </p:nvSpPr>
+          <p:spPr>
+            <a:xfrm rot="16200000">
+              <a:off x="3824522" y="836732"/>
+              <a:ext cx="503902" cy="254462"/>
+            </a:xfrm>
+            <a:prstGeom prst="rect">
+              <a:avLst/>
+            </a:prstGeom>
+            <a:noFill/>
+          </p:spPr>
+          <p:txBody>
+            <a:bodyPr wrap="square" lIns="0" tIns="0" rIns="0" bIns="0" rtlCol="0">
+              <a:noAutofit/>
+            </a:bodyPr>
+            <a:lstStyle/>
+            <a:p>
+              <a:r>
+                <a:rPr lang="en-US" sz="1100" dirty="0" smtClean="0">
+                  <a:solidFill>
+                    <a:schemeClr val="accent5">
+                      <a:lumMod val="75000"/>
+                    </a:schemeClr>
+                  </a:solidFill>
+                </a:rPr>
+                <a:t>creates</a:t>
+              </a:r>
+              <a:endParaRPr lang="en-SG" sz="1100" dirty="0">
+                <a:solidFill>
+                  <a:schemeClr val="accent5">
+                    <a:lumMod val="75000"/>
+                  </a:schemeClr>
+                </a:solidFill>
+              </a:endParaRPr>
+            </a:p>
+          </p:txBody>
+        </p:sp>
+        <p:sp>
+          <p:nvSpPr>
+            <p:cNvPr id="176" name="Isosceles Triangle 175"/>
+            <p:cNvSpPr/>
+            <p:nvPr/>
+          </p:nvSpPr>
+          <p:spPr>
+            <a:xfrm rot="10800000" flipV="1">
+              <a:off x="3979474" y="751200"/>
+              <a:ext cx="132157" cy="79956"/>
+            </a:xfrm>
+            <a:prstGeom prst="triangle">
+              <a:avLst/>
+            </a:prstGeom>
+            <a:solidFill>
+              <a:schemeClr val="accent5">
+                <a:lumMod val="75000"/>
+              </a:schemeClr>
+            </a:solidFill>
+            <a:ln>
+              <a:noFill/>
+            </a:ln>
+          </p:spPr>
+          <p:style>
+            <a:lnRef idx="2">
+              <a:schemeClr val="accent1">
+                <a:shade val="50000"/>
+              </a:schemeClr>
+            </a:lnRef>
+            <a:fillRef idx="1">
+              <a:schemeClr val="accent1"/>
+            </a:fillRef>
+            <a:effectRef idx="0">
+              <a:schemeClr val="accent1"/>
+            </a:effectRef>
+            <a:fontRef idx="minor">
+              <a:schemeClr val="lt1"/>
+            </a:fontRef>
+          </p:style>
+          <p:txBody>
+            <a:bodyPr rtlCol="0" anchor="ctr"/>
+            <a:lstStyle/>
+            <a:p>
+              <a:pPr algn="ctr"/>
+              <a:endParaRPr lang="en-SG"/>
+            </a:p>
+          </p:txBody>
+        </p:sp>
+      </p:grpSp>
+      <p:sp>
+        <p:nvSpPr>
+          <p:cNvPr id="183" name="Rectangle 182"/>
+          <p:cNvSpPr/>
+          <p:nvPr/>
+        </p:nvSpPr>
+        <p:spPr>
+          <a:xfrm>
+            <a:off x="8077200" y="2960731"/>
+            <a:ext cx="762000" cy="315869"/>
+          </a:xfrm>
+          <a:prstGeom prst="rect">
+            <a:avLst/>
+          </a:prstGeom>
+        </p:spPr>
+        <p:style>
+          <a:lnRef idx="2">
+            <a:schemeClr val="accent5">
+              <a:shade val="50000"/>
+            </a:schemeClr>
+          </a:lnRef>
+          <a:fillRef idx="1">
+            <a:schemeClr val="accent5"/>
+          </a:fillRef>
+          <a:effectRef idx="0">
+            <a:schemeClr val="accent5"/>
+          </a:effectRef>
+          <a:fontRef idx="minor">
+            <a:schemeClr val="lt1"/>
+          </a:fontRef>
+        </p:style>
+        <p:txBody>
+          <a:bodyPr rtlCol="0" anchor="ctr"/>
+          <a:lstStyle/>
+          <a:p>
+            <a:pPr algn="ctr"/>
+            <a:r>
+              <a:rPr lang="en-US" sz="1050" b="1" dirty="0" err="1">
+                <a:solidFill>
+                  <a:schemeClr val="bg1"/>
+                </a:solidFill>
+              </a:rPr>
+              <a:t>CommandFormatter</a:t>
+            </a:r>
+            <a:endParaRPr lang="en-US" sz="1050" b="1" dirty="0">
+              <a:solidFill>
+                <a:schemeClr val="bg1"/>
+              </a:solidFill>
+            </a:endParaRPr>
+          </a:p>
+        </p:txBody>
+      </p:sp>
+      <p:cxnSp>
+        <p:nvCxnSpPr>
+          <p:cNvPr id="186" name="Elbow Connector 185"/>
+          <p:cNvCxnSpPr>
+            <a:endCxn id="91" idx="0"/>
+          </p:cNvCxnSpPr>
+          <p:nvPr/>
+        </p:nvCxnSpPr>
+        <p:spPr>
+          <a:xfrm>
+            <a:off x="3663738" y="2290551"/>
+            <a:ext cx="1315465" cy="772538"/>
+          </a:xfrm>
+          <a:prstGeom prst="bentConnector2">
             <a:avLst/>
           </a:prstGeom>
           <a:ln w="19050">
@@ -6430,6 +7582,364 @@
             <a:prstDash val="sysDot"/>
             <a:headEnd type="none" w="med" len="med"/>
             <a:tailEnd type="none" w="med" len="med"/>
+          </a:ln>
+          <a:effectLst/>
+        </p:spPr>
+        <p:style>
+          <a:lnRef idx="1">
+            <a:schemeClr val="accent2"/>
+          </a:lnRef>
+          <a:fillRef idx="2">
+            <a:schemeClr val="accent2"/>
+          </a:fillRef>
+          <a:effectRef idx="1">
+            <a:schemeClr val="accent2"/>
+          </a:effectRef>
+          <a:fontRef idx="minor">
+            <a:schemeClr val="dk1"/>
+          </a:fontRef>
+        </p:style>
+      </p:cxnSp>
+      <p:cxnSp>
+        <p:nvCxnSpPr>
+          <p:cNvPr id="189" name="Elbow Connector 106"/>
+          <p:cNvCxnSpPr>
+            <a:stCxn id="134" idx="1"/>
+            <a:endCxn id="183" idx="1"/>
+          </p:cNvCxnSpPr>
+          <p:nvPr/>
+        </p:nvCxnSpPr>
+        <p:spPr>
+          <a:xfrm>
+            <a:off x="7275343" y="2644135"/>
+            <a:ext cx="801857" cy="474531"/>
+          </a:xfrm>
+          <a:prstGeom prst="bentConnector3">
+            <a:avLst>
+              <a:gd name="adj1" fmla="val 50000"/>
+            </a:avLst>
+          </a:prstGeom>
+          <a:ln w="19050">
+            <a:solidFill>
+              <a:srgbClr val="0070C0"/>
+            </a:solidFill>
+            <a:prstDash val="solid"/>
+            <a:headEnd type="none" w="med" len="med"/>
+            <a:tailEnd type="arrow" w="med" len="med"/>
+          </a:ln>
+          <a:effectLst/>
+        </p:spPr>
+        <p:style>
+          <a:lnRef idx="1">
+            <a:schemeClr val="accent2"/>
+          </a:lnRef>
+          <a:fillRef idx="2">
+            <a:schemeClr val="accent2"/>
+          </a:fillRef>
+          <a:effectRef idx="1">
+            <a:schemeClr val="accent2"/>
+          </a:effectRef>
+          <a:fontRef idx="minor">
+            <a:schemeClr val="dk1"/>
+          </a:fontRef>
+        </p:style>
+      </p:cxnSp>
+      <p:cxnSp>
+        <p:nvCxnSpPr>
+          <p:cNvPr id="192" name="Elbow Connector 106"/>
+          <p:cNvCxnSpPr>
+            <a:stCxn id="135" idx="1"/>
+            <a:endCxn id="183" idx="1"/>
+          </p:cNvCxnSpPr>
+          <p:nvPr/>
+        </p:nvCxnSpPr>
+        <p:spPr>
+          <a:xfrm>
+            <a:off x="7275342" y="3010248"/>
+            <a:ext cx="801858" cy="108418"/>
+          </a:xfrm>
+          <a:prstGeom prst="bentConnector3">
+            <a:avLst>
+              <a:gd name="adj1" fmla="val 50000"/>
+            </a:avLst>
+          </a:prstGeom>
+          <a:ln w="19050">
+            <a:solidFill>
+              <a:srgbClr val="0070C0"/>
+            </a:solidFill>
+            <a:prstDash val="solid"/>
+            <a:headEnd type="none" w="med" len="med"/>
+            <a:tailEnd type="arrow" w="med" len="med"/>
+          </a:ln>
+          <a:effectLst/>
+        </p:spPr>
+        <p:style>
+          <a:lnRef idx="1">
+            <a:schemeClr val="accent2"/>
+          </a:lnRef>
+          <a:fillRef idx="2">
+            <a:schemeClr val="accent2"/>
+          </a:fillRef>
+          <a:effectRef idx="1">
+            <a:schemeClr val="accent2"/>
+          </a:effectRef>
+          <a:fontRef idx="minor">
+            <a:schemeClr val="dk1"/>
+          </a:fontRef>
+        </p:style>
+      </p:cxnSp>
+      <p:cxnSp>
+        <p:nvCxnSpPr>
+          <p:cNvPr id="195" name="Elbow Connector 106"/>
+          <p:cNvCxnSpPr>
+            <a:endCxn id="183" idx="1"/>
+          </p:cNvCxnSpPr>
+          <p:nvPr/>
+        </p:nvCxnSpPr>
+        <p:spPr>
+          <a:xfrm flipV="1">
+            <a:off x="7286627" y="3118666"/>
+            <a:ext cx="790573" cy="274388"/>
+          </a:xfrm>
+          <a:prstGeom prst="bentConnector3">
+            <a:avLst>
+              <a:gd name="adj1" fmla="val 50000"/>
+            </a:avLst>
+          </a:prstGeom>
+          <a:ln w="19050">
+            <a:solidFill>
+              <a:srgbClr val="0070C0"/>
+            </a:solidFill>
+            <a:prstDash val="solid"/>
+            <a:headEnd type="none" w="med" len="med"/>
+            <a:tailEnd type="arrow" w="med" len="med"/>
+          </a:ln>
+          <a:effectLst/>
+        </p:spPr>
+        <p:style>
+          <a:lnRef idx="1">
+            <a:schemeClr val="accent2"/>
+          </a:lnRef>
+          <a:fillRef idx="2">
+            <a:schemeClr val="accent2"/>
+          </a:fillRef>
+          <a:effectRef idx="1">
+            <a:schemeClr val="accent2"/>
+          </a:effectRef>
+          <a:fontRef idx="minor">
+            <a:schemeClr val="dk1"/>
+          </a:fontRef>
+        </p:style>
+      </p:cxnSp>
+      <p:cxnSp>
+        <p:nvCxnSpPr>
+          <p:cNvPr id="198" name="Elbow Connector 106"/>
+          <p:cNvCxnSpPr>
+            <a:stCxn id="137" idx="1"/>
+            <a:endCxn id="183" idx="1"/>
+          </p:cNvCxnSpPr>
+          <p:nvPr/>
+        </p:nvCxnSpPr>
+        <p:spPr>
+          <a:xfrm flipV="1">
+            <a:off x="7267331" y="3118666"/>
+            <a:ext cx="809869" cy="642625"/>
+          </a:xfrm>
+          <a:prstGeom prst="bentConnector3">
+            <a:avLst>
+              <a:gd name="adj1" fmla="val 50000"/>
+            </a:avLst>
+          </a:prstGeom>
+          <a:ln w="19050">
+            <a:solidFill>
+              <a:srgbClr val="0070C0"/>
+            </a:solidFill>
+            <a:prstDash val="solid"/>
+            <a:headEnd type="none" w="med" len="med"/>
+            <a:tailEnd type="arrow" w="med" len="med"/>
+          </a:ln>
+          <a:effectLst/>
+        </p:spPr>
+        <p:style>
+          <a:lnRef idx="1">
+            <a:schemeClr val="accent2"/>
+          </a:lnRef>
+          <a:fillRef idx="2">
+            <a:schemeClr val="accent2"/>
+          </a:fillRef>
+          <a:effectRef idx="1">
+            <a:schemeClr val="accent2"/>
+          </a:effectRef>
+          <a:fontRef idx="minor">
+            <a:schemeClr val="dk1"/>
+          </a:fontRef>
+        </p:style>
+      </p:cxnSp>
+      <p:cxnSp>
+        <p:nvCxnSpPr>
+          <p:cNvPr id="201" name="Elbow Connector 200"/>
+          <p:cNvCxnSpPr>
+            <a:endCxn id="160" idx="1"/>
+          </p:cNvCxnSpPr>
+          <p:nvPr/>
+        </p:nvCxnSpPr>
+        <p:spPr>
+          <a:xfrm rot="16200000" flipV="1">
+            <a:off x="7154824" y="4240672"/>
+            <a:ext cx="517888" cy="276853"/>
+          </a:xfrm>
+          <a:prstGeom prst="bentConnector2">
+            <a:avLst/>
+          </a:prstGeom>
+          <a:ln w="19050">
+            <a:headEnd type="none" w="med" len="med"/>
+            <a:tailEnd type="none" w="med" len="med"/>
+          </a:ln>
+        </p:spPr>
+        <p:style>
+          <a:lnRef idx="1">
+            <a:schemeClr val="accent1"/>
+          </a:lnRef>
+          <a:fillRef idx="0">
+            <a:schemeClr val="accent1"/>
+          </a:fillRef>
+          <a:effectRef idx="0">
+            <a:schemeClr val="accent1"/>
+          </a:effectRef>
+          <a:fontRef idx="minor">
+            <a:schemeClr val="tx1"/>
+          </a:fontRef>
+        </p:style>
+      </p:cxnSp>
+      <p:sp>
+        <p:nvSpPr>
+          <p:cNvPr id="209" name="Rectangle 208"/>
+          <p:cNvSpPr/>
+          <p:nvPr/>
+        </p:nvSpPr>
+        <p:spPr>
+          <a:xfrm flipH="1">
+            <a:off x="4432385" y="3962234"/>
+            <a:ext cx="1093635" cy="312836"/>
+          </a:xfrm>
+          <a:prstGeom prst="rect">
+            <a:avLst/>
+          </a:prstGeom>
+          <a:solidFill>
+            <a:schemeClr val="accent5"/>
+          </a:solidFill>
+          <a:ln/>
+          <a:effectLst/>
+        </p:spPr>
+        <p:style>
+          <a:lnRef idx="1">
+            <a:schemeClr val="accent5"/>
+          </a:lnRef>
+          <a:fillRef idx="2">
+            <a:schemeClr val="accent5"/>
+          </a:fillRef>
+          <a:effectRef idx="1">
+            <a:schemeClr val="accent5"/>
+          </a:effectRef>
+          <a:fontRef idx="minor">
+            <a:schemeClr val="dk1"/>
+          </a:fontRef>
+        </p:style>
+        <p:txBody>
+          <a:bodyPr rtlCol="0" anchor="ctr"/>
+          <a:lstStyle/>
+          <a:p>
+            <a:pPr algn="ctr"/>
+            <a:r>
+              <a:rPr lang="en-US" sz="1050" b="1" dirty="0" smtClean="0">
+                <a:solidFill>
+                  <a:schemeClr val="bg1"/>
+                </a:solidFill>
+              </a:rPr>
+              <a:t>…</a:t>
+            </a:r>
+            <a:endParaRPr lang="en-SG" sz="1050" b="1" dirty="0">
+              <a:solidFill>
+                <a:schemeClr val="bg1"/>
+              </a:solidFill>
+            </a:endParaRPr>
+          </a:p>
+        </p:txBody>
+      </p:sp>
+      <p:cxnSp>
+        <p:nvCxnSpPr>
+          <p:cNvPr id="210" name="Elbow Connector 63"/>
+          <p:cNvCxnSpPr>
+            <a:stCxn id="16" idx="3"/>
+            <a:endCxn id="209" idx="3"/>
+          </p:cNvCxnSpPr>
+          <p:nvPr/>
+        </p:nvCxnSpPr>
+        <p:spPr>
+          <a:xfrm flipV="1">
+            <a:off x="3839361" y="4118652"/>
+            <a:ext cx="593024" cy="527984"/>
+          </a:xfrm>
+          <a:prstGeom prst="bentConnector3">
+            <a:avLst>
+              <a:gd name="adj1" fmla="val 50000"/>
+            </a:avLst>
+          </a:prstGeom>
+          <a:ln w="19050">
+            <a:solidFill>
+              <a:schemeClr val="accent5">
+                <a:lumMod val="75000"/>
+              </a:schemeClr>
+            </a:solidFill>
+            <a:prstDash val="sysDot"/>
+            <a:headEnd type="none" w="med" len="med"/>
+            <a:tailEnd type="arrow" w="med" len="med"/>
+          </a:ln>
+          <a:effectLst/>
+        </p:spPr>
+        <p:style>
+          <a:lnRef idx="1">
+            <a:schemeClr val="accent2"/>
+          </a:lnRef>
+          <a:fillRef idx="2">
+            <a:schemeClr val="accent2"/>
+          </a:fillRef>
+          <a:effectRef idx="1">
+            <a:schemeClr val="accent2"/>
+          </a:effectRef>
+          <a:fontRef idx="minor">
+            <a:schemeClr val="dk1"/>
+          </a:fontRef>
+        </p:style>
+      </p:cxnSp>
+      <p:cxnSp>
+        <p:nvCxnSpPr>
+          <p:cNvPr id="222" name="Elbow Connector 63"/>
+          <p:cNvCxnSpPr>
+            <a:stCxn id="209" idx="1"/>
+            <a:endCxn id="160" idx="3"/>
+          </p:cNvCxnSpPr>
+          <p:nvPr/>
+        </p:nvCxnSpPr>
+        <p:spPr>
+          <a:xfrm>
+            <a:off x="5526020" y="4118652"/>
+            <a:ext cx="655686" cy="1503"/>
+          </a:xfrm>
+          <a:prstGeom prst="bentConnector3">
+            <a:avLst>
+              <a:gd name="adj1" fmla="val 50000"/>
+            </a:avLst>
+          </a:prstGeom>
+          <a:ln w="19050">
+            <a:solidFill>
+              <a:schemeClr val="accent5">
+                <a:lumMod val="75000"/>
+              </a:schemeClr>
+            </a:solidFill>
+            <a:prstDash val="sysDot"/>
+            <a:headEnd type="none" w="med" len="med"/>
+            <a:tailEnd type="arrow" w="med" len="med"/>
           </a:ln>
           <a:effectLst/>
         </p:spPr>

</xml_diff>

<commit_message>
[V0.4][Documentation] update the LogicComponentClassDiagram
</commit_message>
<xml_diff>
--- a/docs/diagrams/LogicComponentClassDiagram.pptx
+++ b/docs/diagrams/LogicComponentClassDiagram.pptx
@@ -3746,20 +3746,18 @@
         <p:nvCxnSpPr>
           <p:cNvPr id="6" name="Elbow Connector 63"/>
           <p:cNvCxnSpPr>
-            <a:stCxn id="12" idx="3"/>
+            <a:stCxn id="12" idx="0"/>
             <a:endCxn id="3" idx="3"/>
           </p:cNvCxnSpPr>
           <p:nvPr/>
         </p:nvCxnSpPr>
         <p:spPr>
-          <a:xfrm flipH="1" flipV="1">
-            <a:off x="2960983" y="664447"/>
-            <a:ext cx="4973860" cy="4355727"/>
-          </a:xfrm>
-          <a:prstGeom prst="bentConnector3">
-            <a:avLst>
-              <a:gd name="adj1" fmla="val -4596"/>
-            </a:avLst>
+          <a:xfrm rot="16200000" flipV="1">
+            <a:off x="2339942" y="1285489"/>
+            <a:ext cx="4212353" cy="2970270"/>
+          </a:xfrm>
+          <a:prstGeom prst="bentConnector2">
+            <a:avLst/>
           </a:prstGeom>
           <a:ln w="19050">
             <a:solidFill>
@@ -4024,7 +4022,7 @@
         </p:nvSpPr>
         <p:spPr>
           <a:xfrm>
-            <a:off x="7162800" y="4846794"/>
+            <a:off x="5545231" y="4876800"/>
             <a:ext cx="772043" cy="346760"/>
           </a:xfrm>
           <a:prstGeom prst="rect">
@@ -4196,7 +4194,7 @@
         </p:nvCxnSpPr>
         <p:spPr>
           <a:xfrm>
-            <a:off x="7548822" y="5193554"/>
+            <a:off x="5931253" y="5223560"/>
             <a:ext cx="0" cy="281555"/>
           </a:xfrm>
           <a:prstGeom prst="straightConnector1">
@@ -4485,8 +4483,8 @@
         </p:nvCxnSpPr>
         <p:spPr>
           <a:xfrm rot="16200000" flipH="1">
-            <a:off x="4506134" y="2363507"/>
-            <a:ext cx="202697" cy="5110636"/>
+            <a:off x="3682346" y="3187294"/>
+            <a:ext cx="232703" cy="3493067"/>
           </a:xfrm>
           <a:prstGeom prst="bentConnector2">
             <a:avLst/>
@@ -5922,8 +5920,8 @@
         </p:nvCxnSpPr>
         <p:spPr>
           <a:xfrm rot="16200000" flipV="1">
-            <a:off x="6018172" y="3147578"/>
-            <a:ext cx="2787823" cy="273480"/>
+            <a:off x="6173930" y="2991820"/>
+            <a:ext cx="2809163" cy="606335"/>
           </a:xfrm>
           <a:prstGeom prst="bentConnector2">
             <a:avLst/>
@@ -5956,7 +5954,7 @@
         </p:nvSpPr>
         <p:spPr>
           <a:xfrm flipV="1">
-            <a:off x="7413571" y="4678229"/>
+            <a:off x="7746426" y="4699569"/>
             <a:ext cx="270504" cy="175523"/>
           </a:xfrm>
           <a:prstGeom prst="triangle">
@@ -6004,43 +6002,6 @@
       </p:sp>
       <p:cxnSp>
         <p:nvCxnSpPr>
-          <p:cNvPr id="90" name="Elbow Connector 89"/>
-          <p:cNvCxnSpPr>
-            <a:stCxn id="87" idx="3"/>
-            <a:endCxn id="11" idx="1"/>
-          </p:cNvCxnSpPr>
-          <p:nvPr/>
-        </p:nvCxnSpPr>
-        <p:spPr>
-          <a:xfrm rot="16200000" flipV="1">
-            <a:off x="7323648" y="4453053"/>
-            <a:ext cx="183846" cy="266505"/>
-          </a:xfrm>
-          <a:prstGeom prst="bentConnector2">
-            <a:avLst/>
-          </a:prstGeom>
-          <a:ln w="19050">
-            <a:headEnd type="none" w="med" len="med"/>
-            <a:tailEnd type="none" w="med" len="med"/>
-          </a:ln>
-        </p:spPr>
-        <p:style>
-          <a:lnRef idx="1">
-            <a:schemeClr val="accent1"/>
-          </a:lnRef>
-          <a:fillRef idx="0">
-            <a:schemeClr val="accent1"/>
-          </a:fillRef>
-          <a:effectRef idx="0">
-            <a:schemeClr val="accent1"/>
-          </a:effectRef>
-          <a:fontRef idx="minor">
-            <a:schemeClr val="tx1"/>
-          </a:fontRef>
-        </p:style>
-      </p:cxnSp>
-      <p:cxnSp>
-        <p:nvCxnSpPr>
           <p:cNvPr id="93" name="Elbow Connector 92"/>
           <p:cNvCxnSpPr>
             <a:stCxn id="87" idx="3"/>
@@ -6050,8 +6011,8 @@
         </p:nvCxnSpPr>
         <p:spPr>
           <a:xfrm rot="16200000" flipV="1">
-            <a:off x="5797626" y="2927032"/>
-            <a:ext cx="3219406" cy="282988"/>
+            <a:off x="5953384" y="2771274"/>
+            <a:ext cx="3240746" cy="615843"/>
           </a:xfrm>
           <a:prstGeom prst="bentConnector2">
             <a:avLst/>
@@ -6087,8 +6048,8 @@
         </p:nvCxnSpPr>
         <p:spPr>
           <a:xfrm rot="16200000" flipV="1">
-            <a:off x="5594971" y="2724377"/>
-            <a:ext cx="3628086" cy="279618"/>
+            <a:off x="5750729" y="2568619"/>
+            <a:ext cx="3649426" cy="612473"/>
           </a:xfrm>
           <a:prstGeom prst="bentConnector2">
             <a:avLst/>
@@ -6699,8 +6660,8 @@
         </p:nvCxnSpPr>
         <p:spPr>
           <a:xfrm rot="16200000" flipV="1">
-            <a:off x="6196171" y="3325577"/>
-            <a:ext cx="2422317" cy="282988"/>
+            <a:off x="6351929" y="3169819"/>
+            <a:ext cx="2443657" cy="615843"/>
           </a:xfrm>
           <a:prstGeom prst="bentConnector2">
             <a:avLst/>
@@ -6896,7 +6857,7 @@
         </p:nvSpPr>
         <p:spPr>
           <a:xfrm flipH="1">
-            <a:off x="6181708" y="2493152"/>
+            <a:off x="6172200" y="2493152"/>
             <a:ext cx="1093635" cy="301966"/>
           </a:xfrm>
           <a:prstGeom prst="rect">
@@ -7228,7 +7189,7 @@
         <p:spPr>
           <a:xfrm flipV="1">
             <a:off x="5526021" y="2644135"/>
-            <a:ext cx="655687" cy="575372"/>
+            <a:ext cx="646179" cy="575372"/>
           </a:xfrm>
           <a:prstGeom prst="bentConnector3">
             <a:avLst>
@@ -7611,12 +7572,12 @@
         </p:nvCxnSpPr>
         <p:spPr>
           <a:xfrm>
-            <a:off x="7275343" y="2644135"/>
-            <a:ext cx="801857" cy="474531"/>
+            <a:off x="7265835" y="2644135"/>
+            <a:ext cx="811365" cy="474531"/>
           </a:xfrm>
           <a:prstGeom prst="bentConnector3">
             <a:avLst>
-              <a:gd name="adj1" fmla="val 50000"/>
+              <a:gd name="adj1" fmla="val 51565"/>
             </a:avLst>
           </a:prstGeom>
           <a:ln w="19050">
@@ -7660,7 +7621,7 @@
           </a:xfrm>
           <a:prstGeom prst="bentConnector3">
             <a:avLst>
-              <a:gd name="adj1" fmla="val 50000"/>
+              <a:gd name="adj1" fmla="val 50792"/>
             </a:avLst>
           </a:prstGeom>
           <a:ln w="19050">
@@ -7747,7 +7708,7 @@
           </a:xfrm>
           <a:prstGeom prst="bentConnector3">
             <a:avLst>
-              <a:gd name="adj1" fmla="val 50000"/>
+              <a:gd name="adj1" fmla="val 52352"/>
             </a:avLst>
           </a:prstGeom>
           <a:ln w="19050">
@@ -7772,42 +7733,6 @@
           </a:effectRef>
           <a:fontRef idx="minor">
             <a:schemeClr val="dk1"/>
-          </a:fontRef>
-        </p:style>
-      </p:cxnSp>
-      <p:cxnSp>
-        <p:nvCxnSpPr>
-          <p:cNvPr id="201" name="Elbow Connector 200"/>
-          <p:cNvCxnSpPr>
-            <a:endCxn id="160" idx="1"/>
-          </p:cNvCxnSpPr>
-          <p:nvPr/>
-        </p:nvCxnSpPr>
-        <p:spPr>
-          <a:xfrm rot="16200000" flipV="1">
-            <a:off x="7154824" y="4240672"/>
-            <a:ext cx="517888" cy="276853"/>
-          </a:xfrm>
-          <a:prstGeom prst="bentConnector2">
-            <a:avLst/>
-          </a:prstGeom>
-          <a:ln w="19050">
-            <a:headEnd type="none" w="med" len="med"/>
-            <a:tailEnd type="none" w="med" len="med"/>
-          </a:ln>
-        </p:spPr>
-        <p:style>
-          <a:lnRef idx="1">
-            <a:schemeClr val="accent1"/>
-          </a:lnRef>
-          <a:fillRef idx="0">
-            <a:schemeClr val="accent1"/>
-          </a:fillRef>
-          <a:effectRef idx="0">
-            <a:schemeClr val="accent1"/>
-          </a:effectRef>
-          <a:fontRef idx="minor">
-            <a:schemeClr val="tx1"/>
           </a:fontRef>
         </p:style>
       </p:cxnSp>
@@ -7938,6 +7863,201 @@
               </a:schemeClr>
             </a:solidFill>
             <a:prstDash val="sysDot"/>
+            <a:headEnd type="none" w="med" len="med"/>
+            <a:tailEnd type="arrow" w="med" len="med"/>
+          </a:ln>
+          <a:effectLst/>
+        </p:spPr>
+        <p:style>
+          <a:lnRef idx="1">
+            <a:schemeClr val="accent2"/>
+          </a:lnRef>
+          <a:fillRef idx="2">
+            <a:schemeClr val="accent2"/>
+          </a:fillRef>
+          <a:effectRef idx="1">
+            <a:schemeClr val="accent2"/>
+          </a:effectRef>
+          <a:fontRef idx="minor">
+            <a:schemeClr val="dk1"/>
+          </a:fontRef>
+        </p:style>
+      </p:cxnSp>
+      <p:sp>
+        <p:nvSpPr>
+          <p:cNvPr id="97" name="Rectangle 62"/>
+          <p:cNvSpPr/>
+          <p:nvPr/>
+        </p:nvSpPr>
+        <p:spPr>
+          <a:xfrm>
+            <a:off x="7228957" y="4876800"/>
+            <a:ext cx="1305443" cy="346760"/>
+          </a:xfrm>
+          <a:prstGeom prst="rect">
+            <a:avLst/>
+          </a:prstGeom>
+          <a:ln w="19050">
+            <a:solidFill>
+              <a:srgbClr val="0070C0"/>
+            </a:solidFill>
+          </a:ln>
+          <a:effectLst/>
+        </p:spPr>
+        <p:style>
+          <a:lnRef idx="1">
+            <a:schemeClr val="accent1"/>
+          </a:lnRef>
+          <a:fillRef idx="2">
+            <a:schemeClr val="accent1"/>
+          </a:fillRef>
+          <a:effectRef idx="1">
+            <a:schemeClr val="accent1"/>
+          </a:effectRef>
+          <a:fontRef idx="minor">
+            <a:schemeClr val="dk1"/>
+          </a:fontRef>
+        </p:style>
+        <p:txBody>
+          <a:bodyPr rtlCol="0" anchor="ctr"/>
+          <a:lstStyle/>
+          <a:p>
+            <a:pPr algn="ctr"/>
+            <a:r>
+              <a:rPr lang="en-US" sz="1050" b="1" dirty="0">
+                <a:solidFill>
+                  <a:srgbClr val="0070C0"/>
+                </a:solidFill>
+              </a:rPr>
+              <a:t>{abstract}</a:t>
+            </a:r>
+            <a:br>
+              <a:rPr lang="en-US" sz="1050" b="1" dirty="0">
+                <a:solidFill>
+                  <a:srgbClr val="0070C0"/>
+                </a:solidFill>
+              </a:rPr>
+            </a:br>
+            <a:r>
+              <a:rPr lang="en-US" sz="1050" b="1" dirty="0" err="1" smtClean="0">
+                <a:solidFill>
+                  <a:srgbClr val="0070C0"/>
+                </a:solidFill>
+              </a:rPr>
+              <a:t>UndoAbleCommand</a:t>
+            </a:r>
+            <a:endParaRPr lang="en-SG" sz="1050" b="1" dirty="0">
+              <a:solidFill>
+                <a:srgbClr val="0070C0"/>
+              </a:solidFill>
+            </a:endParaRPr>
+          </a:p>
+        </p:txBody>
+      </p:sp>
+      <p:cxnSp>
+        <p:nvCxnSpPr>
+          <p:cNvPr id="101" name="Straight Arrow Connector 110"/>
+          <p:cNvCxnSpPr>
+            <a:stCxn id="97" idx="1"/>
+            <a:endCxn id="12" idx="3"/>
+          </p:cNvCxnSpPr>
+          <p:nvPr/>
+        </p:nvCxnSpPr>
+        <p:spPr>
+          <a:xfrm flipH="1">
+            <a:off x="6317274" y="5050180"/>
+            <a:ext cx="911683" cy="0"/>
+          </a:xfrm>
+          <a:prstGeom prst="straightConnector1">
+            <a:avLst/>
+          </a:prstGeom>
+          <a:ln w="19050">
+            <a:solidFill>
+              <a:srgbClr val="0070C0"/>
+            </a:solidFill>
+            <a:prstDash val="sysDot"/>
+            <a:headEnd type="none" w="med" len="med"/>
+            <a:tailEnd type="arrow" w="med" len="med"/>
+          </a:ln>
+          <a:effectLst/>
+        </p:spPr>
+        <p:style>
+          <a:lnRef idx="1">
+            <a:schemeClr val="accent2"/>
+          </a:lnRef>
+          <a:fillRef idx="2">
+            <a:schemeClr val="accent2"/>
+          </a:fillRef>
+          <a:effectRef idx="1">
+            <a:schemeClr val="accent2"/>
+          </a:effectRef>
+          <a:fontRef idx="minor">
+            <a:schemeClr val="dk1"/>
+          </a:fontRef>
+        </p:style>
+      </p:cxnSp>
+      <p:cxnSp>
+        <p:nvCxnSpPr>
+          <p:cNvPr id="145" name="Elbow Connector 106"/>
+          <p:cNvCxnSpPr>
+            <a:stCxn id="11" idx="3"/>
+          </p:cNvCxnSpPr>
+          <p:nvPr/>
+        </p:nvCxnSpPr>
+        <p:spPr>
+          <a:xfrm rot="10800000" flipV="1">
+            <a:off x="6023451" y="4494382"/>
+            <a:ext cx="165233" cy="382417"/>
+          </a:xfrm>
+          <a:prstGeom prst="bentConnector2">
+            <a:avLst/>
+          </a:prstGeom>
+          <a:ln w="19050">
+            <a:solidFill>
+              <a:srgbClr val="0070C0"/>
+            </a:solidFill>
+            <a:prstDash val="solid"/>
+            <a:headEnd type="none" w="med" len="med"/>
+            <a:tailEnd type="arrow" w="med" len="med"/>
+          </a:ln>
+          <a:effectLst/>
+        </p:spPr>
+        <p:style>
+          <a:lnRef idx="1">
+            <a:schemeClr val="accent2"/>
+          </a:lnRef>
+          <a:fillRef idx="2">
+            <a:schemeClr val="accent2"/>
+          </a:fillRef>
+          <a:effectRef idx="1">
+            <a:schemeClr val="accent2"/>
+          </a:effectRef>
+          <a:fontRef idx="minor">
+            <a:schemeClr val="dk1"/>
+          </a:fontRef>
+        </p:style>
+      </p:cxnSp>
+      <p:cxnSp>
+        <p:nvCxnSpPr>
+          <p:cNvPr id="149" name="Elbow Connector 106"/>
+          <p:cNvCxnSpPr/>
+          <p:nvPr/>
+        </p:nvCxnSpPr>
+        <p:spPr>
+          <a:xfrm rot="5400000">
+            <a:off x="5780912" y="4484014"/>
+            <a:ext cx="635323" cy="150246"/>
+          </a:xfrm>
+          <a:prstGeom prst="bentConnector3">
+            <a:avLst>
+              <a:gd name="adj1" fmla="val -1973"/>
+            </a:avLst>
+          </a:prstGeom>
+          <a:ln w="19050">
+            <a:solidFill>
+              <a:srgbClr val="0070C0"/>
+            </a:solidFill>
+            <a:prstDash val="solid"/>
             <a:headEnd type="none" w="med" len="med"/>
             <a:tailEnd type="arrow" w="med" len="med"/>
           </a:ln>

</xml_diff>